<commit_message>
Updated slides to add host link to the demo slide.
</commit_message>
<xml_diff>
--- a/docs/Slides/Team 1 - Final Presentation - MUMLife.pptx
+++ b/docs/Slides/Team 1 - Final Presentation - MUMLife.pptx
@@ -127,7 +127,7 @@
 <file path=ppt/revisionInfo.xml><?xml version="1.0" encoding="utf-8"?>
 <p1510:revInfo xmlns:a="http://schemas.openxmlformats.org/drawingml/2006/main" xmlns:r="http://schemas.openxmlformats.org/officeDocument/2006/relationships" xmlns:p1510="http://schemas.microsoft.com/office/powerpoint/2015/10/main">
   <p1510:revLst>
-    <p1510:client id="{AEDBDEA0-5398-41FD-AE72-76E991D3445A}" v="8" dt="2019-10-23T00:22:25.488"/>
+    <p1510:client id="{D2911C58-5150-4744-8A66-AAECE0A1E0F0}" v="1" dt="2019-10-24T14:35:19.568"/>
   </p1510:revLst>
 </p1510:revInfo>
 </file>
@@ -160,6 +160,30 @@
             <pc:docMk/>
             <pc:sldMk cId="3744593640" sldId="267"/>
             <ac:spMk id="3" creationId="{183DF000-1DAA-4B24-B895-3A717A121100}"/>
+          </ac:spMkLst>
+        </pc:spChg>
+      </pc:sldChg>
+    </pc:docChg>
+  </pc:docChgLst>
+  <pc:docChgLst>
+    <pc:chgData name="Jonathan Getachew" userId="59136f738c513e52" providerId="LiveId" clId="{D2911C58-5150-4744-8A66-AAECE0A1E0F0}"/>
+    <pc:docChg chg="modSld">
+      <pc:chgData name="Jonathan Getachew" userId="59136f738c513e52" providerId="LiveId" clId="{D2911C58-5150-4744-8A66-AAECE0A1E0F0}" dt="2019-10-24T14:35:45.586" v="11" actId="20577"/>
+      <pc:docMkLst>
+        <pc:docMk/>
+      </pc:docMkLst>
+      <pc:sldChg chg="modSp">
+        <pc:chgData name="Jonathan Getachew" userId="59136f738c513e52" providerId="LiveId" clId="{D2911C58-5150-4744-8A66-AAECE0A1E0F0}" dt="2019-10-24T14:35:45.586" v="11" actId="20577"/>
+        <pc:sldMkLst>
+          <pc:docMk/>
+          <pc:sldMk cId="1252393059" sldId="268"/>
+        </pc:sldMkLst>
+        <pc:spChg chg="mod">
+          <ac:chgData name="Jonathan Getachew" userId="59136f738c513e52" providerId="LiveId" clId="{D2911C58-5150-4744-8A66-AAECE0A1E0F0}" dt="2019-10-24T14:35:45.586" v="11" actId="20577"/>
+          <ac:spMkLst>
+            <pc:docMk/>
+            <pc:sldMk cId="1252393059" sldId="268"/>
+            <ac:spMk id="5" creationId="{82DF313E-38EE-4BA7-B232-2051112D761A}"/>
           </ac:spMkLst>
         </pc:spChg>
       </pc:sldChg>
@@ -298,7 +322,7 @@
           <a:p>
             <a:fld id="{ED179185-2361-432C-9044-B01F7AC4C2E5}" type="datetimeFigureOut">
               <a:rPr lang="en-US" smtClean="0"/>
-              <a:t>10/22/2019</a:t>
+              <a:t>10/24/2019</a:t>
             </a:fld>
             <a:endParaRPr lang="en-US"/>
           </a:p>
@@ -799,7 +823,7 @@
           <a:p>
             <a:fld id="{EB99BF06-74B6-4D8D-B70E-97E47FC7094D}" type="datetimeFigureOut">
               <a:rPr lang="en-US" smtClean="0"/>
-              <a:t>10/22/2019</a:t>
+              <a:t>10/24/2019</a:t>
             </a:fld>
             <a:endParaRPr lang="en-US"/>
           </a:p>
@@ -997,7 +1021,7 @@
           <a:p>
             <a:fld id="{EB99BF06-74B6-4D8D-B70E-97E47FC7094D}" type="datetimeFigureOut">
               <a:rPr lang="en-US" smtClean="0"/>
-              <a:t>10/22/2019</a:t>
+              <a:t>10/24/2019</a:t>
             </a:fld>
             <a:endParaRPr lang="en-US"/>
           </a:p>
@@ -1205,7 +1229,7 @@
           <a:p>
             <a:fld id="{EB99BF06-74B6-4D8D-B70E-97E47FC7094D}" type="datetimeFigureOut">
               <a:rPr lang="en-US" smtClean="0"/>
-              <a:t>10/22/2019</a:t>
+              <a:t>10/24/2019</a:t>
             </a:fld>
             <a:endParaRPr lang="en-US"/>
           </a:p>
@@ -1403,7 +1427,7 @@
           <a:p>
             <a:fld id="{EB99BF06-74B6-4D8D-B70E-97E47FC7094D}" type="datetimeFigureOut">
               <a:rPr lang="en-US" smtClean="0"/>
-              <a:t>10/22/2019</a:t>
+              <a:t>10/24/2019</a:t>
             </a:fld>
             <a:endParaRPr lang="en-US"/>
           </a:p>
@@ -1678,7 +1702,7 @@
           <a:p>
             <a:fld id="{EB99BF06-74B6-4D8D-B70E-97E47FC7094D}" type="datetimeFigureOut">
               <a:rPr lang="en-US" smtClean="0"/>
-              <a:t>10/22/2019</a:t>
+              <a:t>10/24/2019</a:t>
             </a:fld>
             <a:endParaRPr lang="en-US"/>
           </a:p>
@@ -1943,7 +1967,7 @@
           <a:p>
             <a:fld id="{EB99BF06-74B6-4D8D-B70E-97E47FC7094D}" type="datetimeFigureOut">
               <a:rPr lang="en-US" smtClean="0"/>
-              <a:t>10/22/2019</a:t>
+              <a:t>10/24/2019</a:t>
             </a:fld>
             <a:endParaRPr lang="en-US"/>
           </a:p>
@@ -2355,7 +2379,7 @@
           <a:p>
             <a:fld id="{EB99BF06-74B6-4D8D-B70E-97E47FC7094D}" type="datetimeFigureOut">
               <a:rPr lang="en-US" smtClean="0"/>
-              <a:t>10/22/2019</a:t>
+              <a:t>10/24/2019</a:t>
             </a:fld>
             <a:endParaRPr lang="en-US"/>
           </a:p>
@@ -2496,7 +2520,7 @@
           <a:p>
             <a:fld id="{EB99BF06-74B6-4D8D-B70E-97E47FC7094D}" type="datetimeFigureOut">
               <a:rPr lang="en-US" smtClean="0"/>
-              <a:t>10/22/2019</a:t>
+              <a:t>10/24/2019</a:t>
             </a:fld>
             <a:endParaRPr lang="en-US"/>
           </a:p>
@@ -2609,7 +2633,7 @@
           <a:p>
             <a:fld id="{EB99BF06-74B6-4D8D-B70E-97E47FC7094D}" type="datetimeFigureOut">
               <a:rPr lang="en-US" smtClean="0"/>
-              <a:t>10/22/2019</a:t>
+              <a:t>10/24/2019</a:t>
             </a:fld>
             <a:endParaRPr lang="en-US"/>
           </a:p>
@@ -2920,7 +2944,7 @@
           <a:p>
             <a:fld id="{EB99BF06-74B6-4D8D-B70E-97E47FC7094D}" type="datetimeFigureOut">
               <a:rPr lang="en-US" smtClean="0"/>
-              <a:t>10/22/2019</a:t>
+              <a:t>10/24/2019</a:t>
             </a:fld>
             <a:endParaRPr lang="en-US"/>
           </a:p>
@@ -3208,7 +3232,7 @@
           <a:p>
             <a:fld id="{EB99BF06-74B6-4D8D-B70E-97E47FC7094D}" type="datetimeFigureOut">
               <a:rPr lang="en-US" smtClean="0"/>
-              <a:t>10/22/2019</a:t>
+              <a:t>10/24/2019</a:t>
             </a:fld>
             <a:endParaRPr lang="en-US"/>
           </a:p>
@@ -3449,7 +3473,7 @@
           <a:p>
             <a:fld id="{EB99BF06-74B6-4D8D-B70E-97E47FC7094D}" type="datetimeFigureOut">
               <a:rPr lang="en-US" smtClean="0"/>
-              <a:t>10/22/2019</a:t>
+              <a:t>10/24/2019</a:t>
             </a:fld>
             <a:endParaRPr lang="en-US"/>
           </a:p>
@@ -5810,7 +5834,22 @@
           <a:bodyPr/>
           <a:lstStyle/>
           <a:p>
+            <a:pPr algn="ctr"/>
             <a:endParaRPr lang="en-US"/>
+          </a:p>
+          <a:p>
+            <a:pPr algn="ctr"/>
+            <a:r>
+              <a:rPr lang="en-US"/>
+              <a:t>https</a:t>
+            </a:r>
+            <a:r>
+              <a:rPr lang="en-US" dirty="0"/>
+              <a:t>://mum-life.herokuapp.com</a:t>
+            </a:r>
+          </a:p>
+          <a:p>
+            <a:endParaRPr lang="en-US" dirty="0"/>
           </a:p>
         </p:txBody>
       </p:sp>

</xml_diff>

<commit_message>
Made changes to slide
</commit_message>
<xml_diff>
--- a/docs/Slides/Team 1 - Final Presentation - MUMLife.pptx
+++ b/docs/Slides/Team 1 - Final Presentation - MUMLife.pptx
@@ -5,19 +5,18 @@
     <p:sldMasterId id="2147483648" r:id="rId1"/>
   </p:sldMasterIdLst>
   <p:notesMasterIdLst>
-    <p:notesMasterId r:id="rId12"/>
+    <p:notesMasterId r:id="rId11"/>
   </p:notesMasterIdLst>
   <p:sldIdLst>
     <p:sldId id="256" r:id="rId2"/>
-    <p:sldId id="267" r:id="rId3"/>
-    <p:sldId id="262" r:id="rId4"/>
-    <p:sldId id="258" r:id="rId5"/>
-    <p:sldId id="259" r:id="rId6"/>
-    <p:sldId id="257" r:id="rId7"/>
-    <p:sldId id="266" r:id="rId8"/>
-    <p:sldId id="261" r:id="rId9"/>
-    <p:sldId id="268" r:id="rId10"/>
-    <p:sldId id="263" r:id="rId11"/>
+    <p:sldId id="262" r:id="rId3"/>
+    <p:sldId id="258" r:id="rId4"/>
+    <p:sldId id="259" r:id="rId5"/>
+    <p:sldId id="257" r:id="rId6"/>
+    <p:sldId id="266" r:id="rId7"/>
+    <p:sldId id="261" r:id="rId8"/>
+    <p:sldId id="268" r:id="rId9"/>
+    <p:sldId id="263" r:id="rId10"/>
   </p:sldIdLst>
   <p:sldSz cx="12192000" cy="6858000"/>
   <p:notesSz cx="6858000" cy="9144000"/>
@@ -237,6 +236,37 @@
       </pc:sldChg>
     </pc:docChg>
   </pc:docChgLst>
+  <pc:docChgLst>
+    <pc:chgData name="Jonathan Getachew" userId="59136f738c513e52" providerId="LiveId" clId="{2F99FF90-C535-480E-A33D-5520BE1CE585}"/>
+    <pc:docChg chg="delSld modSld">
+      <pc:chgData name="Jonathan Getachew" userId="59136f738c513e52" providerId="LiveId" clId="{2F99FF90-C535-480E-A33D-5520BE1CE585}" dt="2019-10-24T15:07:07.692" v="2" actId="20577"/>
+      <pc:docMkLst>
+        <pc:docMk/>
+      </pc:docMkLst>
+      <pc:sldChg chg="del">
+        <pc:chgData name="Jonathan Getachew" userId="59136f738c513e52" providerId="LiveId" clId="{2F99FF90-C535-480E-A33D-5520BE1CE585}" dt="2019-10-24T15:07:01.509" v="0" actId="2696"/>
+        <pc:sldMkLst>
+          <pc:docMk/>
+          <pc:sldMk cId="3744593640" sldId="267"/>
+        </pc:sldMkLst>
+      </pc:sldChg>
+      <pc:sldChg chg="modSp">
+        <pc:chgData name="Jonathan Getachew" userId="59136f738c513e52" providerId="LiveId" clId="{2F99FF90-C535-480E-A33D-5520BE1CE585}" dt="2019-10-24T15:07:07.692" v="2" actId="20577"/>
+        <pc:sldMkLst>
+          <pc:docMk/>
+          <pc:sldMk cId="1252393059" sldId="268"/>
+        </pc:sldMkLst>
+        <pc:spChg chg="mod">
+          <ac:chgData name="Jonathan Getachew" userId="59136f738c513e52" providerId="LiveId" clId="{2F99FF90-C535-480E-A33D-5520BE1CE585}" dt="2019-10-24T15:07:07.692" v="2" actId="20577"/>
+          <ac:spMkLst>
+            <pc:docMk/>
+            <pc:sldMk cId="1252393059" sldId="268"/>
+            <ac:spMk id="5" creationId="{82DF313E-38EE-4BA7-B232-2051112D761A}"/>
+          </ac:spMkLst>
+        </pc:spChg>
+      </pc:sldChg>
+    </pc:docChg>
+  </pc:docChgLst>
 </pc:chgInfo>
 </file>
 
@@ -657,7 +687,7 @@
           <a:p>
             <a:fld id="{3137533E-820E-4480-8C72-83FACE7C6D9D}" type="slidenum">
               <a:rPr lang="en-US" smtClean="0"/>
-              <a:t>3</a:t>
+              <a:t>2</a:t>
             </a:fld>
             <a:endParaRPr lang="en-US"/>
           </a:p>
@@ -4127,7 +4157,1187 @@
 </p:sld>
 </file>
 
-<file path=ppt/slides/slide10.xml><?xml version="1.0" encoding="utf-8"?>
+<file path=ppt/slides/slide2.xml><?xml version="1.0" encoding="utf-8"?>
+<p:sld xmlns:a="http://schemas.openxmlformats.org/drawingml/2006/main" xmlns:r="http://schemas.openxmlformats.org/officeDocument/2006/relationships" xmlns:p="http://schemas.openxmlformats.org/presentationml/2006/main">
+  <p:cSld>
+    <p:spTree>
+      <p:nvGrpSpPr>
+        <p:cNvPr id="1" name=""/>
+        <p:cNvGrpSpPr/>
+        <p:nvPr/>
+      </p:nvGrpSpPr>
+      <p:grpSpPr>
+        <a:xfrm>
+          <a:off x="0" y="0"/>
+          <a:ext cx="0" cy="0"/>
+          <a:chOff x="0" y="0"/>
+          <a:chExt cx="0" cy="0"/>
+        </a:xfrm>
+      </p:grpSpPr>
+      <p:sp>
+        <p:nvSpPr>
+          <p:cNvPr id="2" name="Title 1">
+            <a:extLst>
+              <a:ext uri="{FF2B5EF4-FFF2-40B4-BE49-F238E27FC236}">
+                <a16:creationId xmlns:a16="http://schemas.microsoft.com/office/drawing/2014/main" id="{D4527414-61B0-4CE2-B254-637FCC18EBF7}"/>
+              </a:ext>
+            </a:extLst>
+          </p:cNvPr>
+          <p:cNvSpPr>
+            <a:spLocks noGrp="1"/>
+          </p:cNvSpPr>
+          <p:nvPr>
+            <p:ph type="title"/>
+          </p:nvPr>
+        </p:nvSpPr>
+        <p:spPr/>
+        <p:txBody>
+          <a:bodyPr/>
+          <a:lstStyle/>
+          <a:p>
+            <a:r>
+              <a:rPr lang="en-US" dirty="0"/>
+              <a:t>Problem Statement</a:t>
+            </a:r>
+          </a:p>
+        </p:txBody>
+      </p:sp>
+      <p:sp>
+        <p:nvSpPr>
+          <p:cNvPr id="3" name="Content Placeholder 2">
+            <a:extLst>
+              <a:ext uri="{FF2B5EF4-FFF2-40B4-BE49-F238E27FC236}">
+                <a16:creationId xmlns:a16="http://schemas.microsoft.com/office/drawing/2014/main" id="{14E6595D-448A-41E4-AC76-D00EB0C3C119}"/>
+              </a:ext>
+            </a:extLst>
+          </p:cNvPr>
+          <p:cNvSpPr>
+            <a:spLocks noGrp="1"/>
+          </p:cNvSpPr>
+          <p:nvPr>
+            <p:ph idx="1"/>
+          </p:nvPr>
+        </p:nvSpPr>
+        <p:spPr/>
+        <p:txBody>
+          <a:bodyPr>
+            <a:normAutofit/>
+          </a:bodyPr>
+          <a:lstStyle/>
+          <a:p>
+            <a:endParaRPr lang="en-US" dirty="0"/>
+          </a:p>
+          <a:p>
+            <a:r>
+              <a:rPr lang="en-US" dirty="0"/>
+              <a:t>Managing and Renting items from the Recreation Center. </a:t>
+            </a:r>
+          </a:p>
+          <a:p>
+            <a:endParaRPr lang="en-US" dirty="0"/>
+          </a:p>
+          <a:p>
+            <a:endParaRPr lang="en-US" dirty="0"/>
+          </a:p>
+          <a:p>
+            <a:r>
+              <a:rPr lang="en-US" dirty="0"/>
+              <a:t>Managing and Getting information about events. </a:t>
+            </a:r>
+          </a:p>
+          <a:p>
+            <a:endParaRPr lang="en-US" dirty="0"/>
+          </a:p>
+        </p:txBody>
+      </p:sp>
+    </p:spTree>
+    <p:extLst>
+      <p:ext uri="{BB962C8B-B14F-4D97-AF65-F5344CB8AC3E}">
+        <p14:creationId xmlns:p14="http://schemas.microsoft.com/office/powerpoint/2010/main" val="1721247881"/>
+      </p:ext>
+    </p:extLst>
+  </p:cSld>
+  <p:clrMapOvr>
+    <a:masterClrMapping/>
+  </p:clrMapOvr>
+  <p:transition>
+    <p:push dir="u"/>
+  </p:transition>
+</p:sld>
+</file>
+
+<file path=ppt/slides/slide3.xml><?xml version="1.0" encoding="utf-8"?>
+<p:sld xmlns:a="http://schemas.openxmlformats.org/drawingml/2006/main" xmlns:r="http://schemas.openxmlformats.org/officeDocument/2006/relationships" xmlns:p="http://schemas.openxmlformats.org/presentationml/2006/main">
+  <p:cSld>
+    <p:bg>
+      <p:bgPr>
+        <a:solidFill>
+          <a:schemeClr val="bg1"/>
+        </a:solidFill>
+        <a:effectLst/>
+      </p:bgPr>
+    </p:bg>
+    <p:spTree>
+      <p:nvGrpSpPr>
+        <p:cNvPr id="1" name=""/>
+        <p:cNvGrpSpPr/>
+        <p:nvPr/>
+      </p:nvGrpSpPr>
+      <p:grpSpPr>
+        <a:xfrm>
+          <a:off x="0" y="0"/>
+          <a:ext cx="0" cy="0"/>
+          <a:chOff x="0" y="0"/>
+          <a:chExt cx="0" cy="0"/>
+        </a:xfrm>
+      </p:grpSpPr>
+      <p:sp>
+        <p:nvSpPr>
+          <p:cNvPr id="12" name="Rectangle 11">
+            <a:extLst>
+              <a:ext uri="{FF2B5EF4-FFF2-40B4-BE49-F238E27FC236}">
+                <a16:creationId xmlns:a16="http://schemas.microsoft.com/office/drawing/2014/main" id="{57845966-6EFC-468A-9CC7-BAB4B95854E7}"/>
+              </a:ext>
+              <a:ext uri="{C183D7F6-B498-43B3-948B-1728B52AA6E4}">
+                <adec:decorative xmlns:adec="http://schemas.microsoft.com/office/drawing/2017/decorative" val="1"/>
+              </a:ext>
+            </a:extLst>
+          </p:cNvPr>
+          <p:cNvSpPr>
+            <a:spLocks noGrp="1" noRot="1" noChangeAspect="1" noMove="1" noResize="1" noEditPoints="1" noAdjustHandles="1" noChangeArrowheads="1" noChangeShapeType="1" noTextEdit="1"/>
+          </p:cNvSpPr>
+          <p:nvPr>
+            <p:extLst>
+              <p:ext uri="{386F3935-93C4-4BCD-93E2-E3B085C9AB24}">
+                <p16:designElem xmlns:p16="http://schemas.microsoft.com/office/powerpoint/2015/main" val="1"/>
+              </p:ext>
+            </p:extLst>
+          </p:nvPr>
+        </p:nvSpPr>
+        <p:spPr>
+          <a:xfrm>
+            <a:off x="1354372" y="0"/>
+            <a:ext cx="9483256" cy="6858000"/>
+          </a:xfrm>
+          <a:prstGeom prst="rect">
+            <a:avLst/>
+          </a:prstGeom>
+          <a:gradFill>
+            <a:gsLst>
+              <a:gs pos="0">
+                <a:schemeClr val="accent1">
+                  <a:lumMod val="100000"/>
+                  <a:alpha val="82000"/>
+                </a:schemeClr>
+              </a:gs>
+              <a:gs pos="25000">
+                <a:schemeClr val="accent1">
+                  <a:alpha val="60000"/>
+                </a:schemeClr>
+              </a:gs>
+              <a:gs pos="94000">
+                <a:schemeClr val="bg2">
+                  <a:lumMod val="75000"/>
+                </a:schemeClr>
+              </a:gs>
+              <a:gs pos="100000">
+                <a:schemeClr val="bg2">
+                  <a:lumMod val="75000"/>
+                </a:schemeClr>
+              </a:gs>
+            </a:gsLst>
+            <a:lin ang="4200000" scaled="0"/>
+          </a:gradFill>
+          <a:ln>
+            <a:noFill/>
+          </a:ln>
+        </p:spPr>
+        <p:style>
+          <a:lnRef idx="2">
+            <a:schemeClr val="accent1">
+              <a:shade val="50000"/>
+            </a:schemeClr>
+          </a:lnRef>
+          <a:fillRef idx="1">
+            <a:schemeClr val="accent1"/>
+          </a:fillRef>
+          <a:effectRef idx="0">
+            <a:schemeClr val="accent1"/>
+          </a:effectRef>
+          <a:fontRef idx="minor">
+            <a:schemeClr val="lt1"/>
+          </a:fontRef>
+        </p:style>
+        <p:txBody>
+          <a:bodyPr rtlCol="0" anchor="ctr"/>
+          <a:lstStyle/>
+          <a:p>
+            <a:pPr algn="ctr"/>
+            <a:endParaRPr lang="en-US"/>
+          </a:p>
+        </p:txBody>
+      </p:sp>
+      <p:pic>
+        <p:nvPicPr>
+          <p:cNvPr id="14" name="Picture 13">
+            <a:extLst>
+              <a:ext uri="{FF2B5EF4-FFF2-40B4-BE49-F238E27FC236}">
+                <a16:creationId xmlns:a16="http://schemas.microsoft.com/office/drawing/2014/main" id="{75554383-98AF-4A47-BB65-705FAAA4BE6A}"/>
+              </a:ext>
+              <a:ext uri="{C183D7F6-B498-43B3-948B-1728B52AA6E4}">
+                <adec:decorative xmlns:adec="http://schemas.microsoft.com/office/drawing/2017/decorative" val="1"/>
+              </a:ext>
+            </a:extLst>
+          </p:cNvPr>
+          <p:cNvPicPr>
+            <a:picLocks noGrp="1" noRot="1" noChangeAspect="1" noMove="1" noResize="1" noEditPoints="1" noAdjustHandles="1" noChangeArrowheads="1" noChangeShapeType="1" noCrop="1"/>
+          </p:cNvPicPr>
+          <p:nvPr>
+            <p:extLst>
+              <p:ext uri="{386F3935-93C4-4BCD-93E2-E3B085C9AB24}">
+                <p16:designElem xmlns:p16="http://schemas.microsoft.com/office/powerpoint/2015/main" val="1"/>
+              </p:ext>
+            </p:extLst>
+          </p:nvPr>
+        </p:nvPicPr>
+        <p:blipFill>
+          <a:blip r:embed="rId2">
+            <a:extLst>
+              <a:ext uri="{28A0092B-C50C-407E-A947-70E740481C1C}">
+                <a14:useLocalDpi xmlns:a14="http://schemas.microsoft.com/office/drawing/2010/main" val="0"/>
+              </a:ext>
+            </a:extLst>
+          </a:blip>
+          <a:stretch>
+            <a:fillRect/>
+          </a:stretch>
+        </p:blipFill>
+        <p:spPr>
+          <a:xfrm>
+            <a:off x="0" y="0"/>
+            <a:ext cx="12192000" cy="6858000"/>
+          </a:xfrm>
+          <a:prstGeom prst="rect">
+            <a:avLst/>
+          </a:prstGeom>
+        </p:spPr>
+      </p:pic>
+      <p:sp>
+        <p:nvSpPr>
+          <p:cNvPr id="16" name="Freeform: Shape 15">
+            <a:extLst>
+              <a:ext uri="{FF2B5EF4-FFF2-40B4-BE49-F238E27FC236}">
+                <a16:creationId xmlns:a16="http://schemas.microsoft.com/office/drawing/2014/main" id="{ADAD1991-FFD1-4E94-ABAB-7560D33008E4}"/>
+              </a:ext>
+              <a:ext uri="{C183D7F6-B498-43B3-948B-1728B52AA6E4}">
+                <adec:decorative xmlns:adec="http://schemas.microsoft.com/office/drawing/2017/decorative" val="1"/>
+              </a:ext>
+            </a:extLst>
+          </p:cNvPr>
+          <p:cNvSpPr>
+            <a:spLocks noGrp="1" noRot="1" noChangeAspect="1" noMove="1" noResize="1" noEditPoints="1" noAdjustHandles="1" noChangeArrowheads="1" noChangeShapeType="1" noTextEdit="1"/>
+          </p:cNvSpPr>
+          <p:nvPr>
+            <p:extLst>
+              <p:ext uri="{386F3935-93C4-4BCD-93E2-E3B085C9AB24}">
+                <p16:designElem xmlns:p16="http://schemas.microsoft.com/office/powerpoint/2015/main" val="1"/>
+              </p:ext>
+            </p:extLst>
+          </p:nvPr>
+        </p:nvSpPr>
+        <p:spPr>
+          <a:xfrm>
+            <a:off x="2144484" y="0"/>
+            <a:ext cx="7837716" cy="6858000"/>
+          </a:xfrm>
+          <a:custGeom>
+            <a:avLst/>
+            <a:gdLst>
+              <a:gd name="connsiteX0" fmla="*/ 2232159 w 7837716"/>
+              <a:gd name="connsiteY0" fmla="*/ 0 h 6858000"/>
+              <a:gd name="connsiteX1" fmla="*/ 5605557 w 7837716"/>
+              <a:gd name="connsiteY1" fmla="*/ 0 h 6858000"/>
+              <a:gd name="connsiteX2" fmla="*/ 5617845 w 7837716"/>
+              <a:gd name="connsiteY2" fmla="*/ 5384 h 6858000"/>
+              <a:gd name="connsiteX3" fmla="*/ 7837716 w 7837716"/>
+              <a:gd name="connsiteY3" fmla="*/ 3429000 h 6858000"/>
+              <a:gd name="connsiteX4" fmla="*/ 5617845 w 7837716"/>
+              <a:gd name="connsiteY4" fmla="*/ 6852616 h 6858000"/>
+              <a:gd name="connsiteX5" fmla="*/ 5605557 w 7837716"/>
+              <a:gd name="connsiteY5" fmla="*/ 6858000 h 6858000"/>
+              <a:gd name="connsiteX6" fmla="*/ 2232159 w 7837716"/>
+              <a:gd name="connsiteY6" fmla="*/ 6858000 h 6858000"/>
+              <a:gd name="connsiteX7" fmla="*/ 2219871 w 7837716"/>
+              <a:gd name="connsiteY7" fmla="*/ 6852616 h 6858000"/>
+              <a:gd name="connsiteX8" fmla="*/ 0 w 7837716"/>
+              <a:gd name="connsiteY8" fmla="*/ 3429000 h 6858000"/>
+              <a:gd name="connsiteX9" fmla="*/ 2219871 w 7837716"/>
+              <a:gd name="connsiteY9" fmla="*/ 5384 h 6858000"/>
+            </a:gdLst>
+            <a:ahLst/>
+            <a:cxnLst>
+              <a:cxn ang="0">
+                <a:pos x="connsiteX0" y="connsiteY0"/>
+              </a:cxn>
+              <a:cxn ang="0">
+                <a:pos x="connsiteX1" y="connsiteY1"/>
+              </a:cxn>
+              <a:cxn ang="0">
+                <a:pos x="connsiteX2" y="connsiteY2"/>
+              </a:cxn>
+              <a:cxn ang="0">
+                <a:pos x="connsiteX3" y="connsiteY3"/>
+              </a:cxn>
+              <a:cxn ang="0">
+                <a:pos x="connsiteX4" y="connsiteY4"/>
+              </a:cxn>
+              <a:cxn ang="0">
+                <a:pos x="connsiteX5" y="connsiteY5"/>
+              </a:cxn>
+              <a:cxn ang="0">
+                <a:pos x="connsiteX6" y="connsiteY6"/>
+              </a:cxn>
+              <a:cxn ang="0">
+                <a:pos x="connsiteX7" y="connsiteY7"/>
+              </a:cxn>
+              <a:cxn ang="0">
+                <a:pos x="connsiteX8" y="connsiteY8"/>
+              </a:cxn>
+              <a:cxn ang="0">
+                <a:pos x="connsiteX9" y="connsiteY9"/>
+              </a:cxn>
+            </a:cxnLst>
+            <a:rect l="l" t="t" r="r" b="b"/>
+            <a:pathLst>
+              <a:path w="7837716" h="6858000">
+                <a:moveTo>
+                  <a:pt x="2232159" y="0"/>
+                </a:moveTo>
+                <a:lnTo>
+                  <a:pt x="5605557" y="0"/>
+                </a:lnTo>
+                <a:lnTo>
+                  <a:pt x="5617845" y="5384"/>
+                </a:lnTo>
+                <a:cubicBezTo>
+                  <a:pt x="6931322" y="618789"/>
+                  <a:pt x="7837716" y="1921305"/>
+                  <a:pt x="7837716" y="3429000"/>
+                </a:cubicBezTo>
+                <a:cubicBezTo>
+                  <a:pt x="7837716" y="4936696"/>
+                  <a:pt x="6931322" y="6239212"/>
+                  <a:pt x="5617845" y="6852616"/>
+                </a:cubicBezTo>
+                <a:lnTo>
+                  <a:pt x="5605557" y="6858000"/>
+                </a:lnTo>
+                <a:lnTo>
+                  <a:pt x="2232159" y="6858000"/>
+                </a:lnTo>
+                <a:lnTo>
+                  <a:pt x="2219871" y="6852616"/>
+                </a:lnTo>
+                <a:cubicBezTo>
+                  <a:pt x="906394" y="6239212"/>
+                  <a:pt x="0" y="4936696"/>
+                  <a:pt x="0" y="3429000"/>
+                </a:cubicBezTo>
+                <a:cubicBezTo>
+                  <a:pt x="0" y="1921305"/>
+                  <a:pt x="906394" y="618789"/>
+                  <a:pt x="2219871" y="5384"/>
+                </a:cubicBezTo>
+                <a:close/>
+              </a:path>
+            </a:pathLst>
+          </a:custGeom>
+          <a:solidFill>
+            <a:schemeClr val="bg1"/>
+          </a:solidFill>
+          <a:ln>
+            <a:gradFill>
+              <a:gsLst>
+                <a:gs pos="0">
+                  <a:schemeClr val="accent1">
+                    <a:lumMod val="40000"/>
+                    <a:lumOff val="60000"/>
+                  </a:schemeClr>
+                </a:gs>
+                <a:gs pos="23000">
+                  <a:schemeClr val="accent1">
+                    <a:lumMod val="45000"/>
+                    <a:lumOff val="55000"/>
+                  </a:schemeClr>
+                </a:gs>
+                <a:gs pos="83000">
+                  <a:schemeClr val="bg2">
+                    <a:lumMod val="82000"/>
+                  </a:schemeClr>
+                </a:gs>
+                <a:gs pos="100000">
+                  <a:schemeClr val="bg2">
+                    <a:lumMod val="87000"/>
+                  </a:schemeClr>
+                </a:gs>
+              </a:gsLst>
+              <a:lin ang="5400000" scaled="1"/>
+            </a:gradFill>
+          </a:ln>
+        </p:spPr>
+        <p:style>
+          <a:lnRef idx="2">
+            <a:schemeClr val="accent1">
+              <a:shade val="50000"/>
+            </a:schemeClr>
+          </a:lnRef>
+          <a:fillRef idx="1">
+            <a:schemeClr val="accent1"/>
+          </a:fillRef>
+          <a:effectRef idx="0">
+            <a:schemeClr val="accent1"/>
+          </a:effectRef>
+          <a:fontRef idx="minor">
+            <a:schemeClr val="lt1"/>
+          </a:fontRef>
+        </p:style>
+        <p:txBody>
+          <a:bodyPr wrap="square" rtlCol="0" anchor="ctr">
+            <a:noAutofit/>
+          </a:bodyPr>
+          <a:lstStyle/>
+          <a:p>
+            <a:pPr algn="ctr"/>
+            <a:endParaRPr lang="en-US"/>
+          </a:p>
+        </p:txBody>
+      </p:sp>
+      <p:pic>
+        <p:nvPicPr>
+          <p:cNvPr id="5" name="Content Placeholder 4">
+            <a:extLst>
+              <a:ext uri="{FF2B5EF4-FFF2-40B4-BE49-F238E27FC236}">
+                <a16:creationId xmlns:a16="http://schemas.microsoft.com/office/drawing/2014/main" id="{46608679-9C80-409E-9161-F495FF9614A4}"/>
+              </a:ext>
+            </a:extLst>
+          </p:cNvPr>
+          <p:cNvPicPr>
+            <a:picLocks noGrp="1" noChangeAspect="1"/>
+          </p:cNvPicPr>
+          <p:nvPr>
+            <p:ph idx="1"/>
+          </p:nvPr>
+        </p:nvPicPr>
+        <p:blipFill>
+          <a:blip r:embed="rId3">
+            <a:extLst>
+              <a:ext uri="{28A0092B-C50C-407E-A947-70E740481C1C}">
+                <a14:useLocalDpi xmlns:a14="http://schemas.microsoft.com/office/drawing/2010/main" val="0"/>
+              </a:ext>
+            </a:extLst>
+          </a:blip>
+          <a:stretch>
+            <a:fillRect/>
+          </a:stretch>
+        </p:blipFill>
+        <p:spPr>
+          <a:xfrm>
+            <a:off x="3389702" y="850007"/>
+            <a:ext cx="5525329" cy="5166183"/>
+          </a:xfrm>
+          <a:prstGeom prst="rect">
+            <a:avLst/>
+          </a:prstGeom>
+        </p:spPr>
+      </p:pic>
+      <p:sp>
+        <p:nvSpPr>
+          <p:cNvPr id="8" name="TextBox 7">
+            <a:extLst>
+              <a:ext uri="{FF2B5EF4-FFF2-40B4-BE49-F238E27FC236}">
+                <a16:creationId xmlns:a16="http://schemas.microsoft.com/office/drawing/2014/main" id="{0E1AD40A-7B9F-48FE-8DF2-C9720D09EC34}"/>
+              </a:ext>
+            </a:extLst>
+          </p:cNvPr>
+          <p:cNvSpPr txBox="1"/>
+          <p:nvPr/>
+        </p:nvSpPr>
+        <p:spPr>
+          <a:xfrm>
+            <a:off x="4568352" y="326787"/>
+            <a:ext cx="2424190" cy="461665"/>
+          </a:xfrm>
+          <a:prstGeom prst="rect">
+            <a:avLst/>
+          </a:prstGeom>
+          <a:noFill/>
+        </p:spPr>
+        <p:txBody>
+          <a:bodyPr wrap="none" rtlCol="0">
+            <a:spAutoFit/>
+          </a:bodyPr>
+          <a:lstStyle/>
+          <a:p>
+            <a:r>
+              <a:rPr lang="en-US" sz="2400" dirty="0"/>
+              <a:t>Use Case Diagram</a:t>
+            </a:r>
+          </a:p>
+        </p:txBody>
+      </p:sp>
+    </p:spTree>
+    <p:extLst>
+      <p:ext uri="{BB962C8B-B14F-4D97-AF65-F5344CB8AC3E}">
+        <p14:creationId xmlns:p14="http://schemas.microsoft.com/office/powerpoint/2010/main" val="674919100"/>
+      </p:ext>
+    </p:extLst>
+  </p:cSld>
+  <p:clrMapOvr>
+    <a:masterClrMapping/>
+  </p:clrMapOvr>
+  <p:transition>
+    <p:push dir="u"/>
+  </p:transition>
+</p:sld>
+</file>
+
+<file path=ppt/slides/slide4.xml><?xml version="1.0" encoding="utf-8"?>
+<p:sld xmlns:a="http://schemas.openxmlformats.org/drawingml/2006/main" xmlns:r="http://schemas.openxmlformats.org/officeDocument/2006/relationships" xmlns:p="http://schemas.openxmlformats.org/presentationml/2006/main">
+  <p:cSld>
+    <p:bg>
+      <p:bgPr>
+        <a:solidFill>
+          <a:schemeClr val="bg1"/>
+        </a:solidFill>
+        <a:effectLst/>
+      </p:bgPr>
+    </p:bg>
+    <p:spTree>
+      <p:nvGrpSpPr>
+        <p:cNvPr id="1" name=""/>
+        <p:cNvGrpSpPr/>
+        <p:nvPr/>
+      </p:nvGrpSpPr>
+      <p:grpSpPr>
+        <a:xfrm>
+          <a:off x="0" y="0"/>
+          <a:ext cx="0" cy="0"/>
+          <a:chOff x="0" y="0"/>
+          <a:chExt cx="0" cy="0"/>
+        </a:xfrm>
+      </p:grpSpPr>
+      <p:sp>
+        <p:nvSpPr>
+          <p:cNvPr id="10" name="Rectangle 9">
+            <a:extLst>
+              <a:ext uri="{FF2B5EF4-FFF2-40B4-BE49-F238E27FC236}">
+                <a16:creationId xmlns:a16="http://schemas.microsoft.com/office/drawing/2014/main" id="{01D0AF59-99C3-4251-AB9A-C966C6AD4400}"/>
+              </a:ext>
+              <a:ext uri="{C183D7F6-B498-43B3-948B-1728B52AA6E4}">
+                <adec:decorative xmlns:adec="http://schemas.microsoft.com/office/drawing/2017/decorative" val="1"/>
+              </a:ext>
+            </a:extLst>
+          </p:cNvPr>
+          <p:cNvSpPr>
+            <a:spLocks noGrp="1" noRot="1" noChangeAspect="1" noMove="1" noResize="1" noEditPoints="1" noAdjustHandles="1" noChangeArrowheads="1" noChangeShapeType="1" noTextEdit="1"/>
+          </p:cNvSpPr>
+          <p:nvPr>
+            <p:extLst>
+              <p:ext uri="{386F3935-93C4-4BCD-93E2-E3B085C9AB24}">
+                <p16:designElem xmlns:p16="http://schemas.microsoft.com/office/powerpoint/2015/main" val="1"/>
+              </p:ext>
+            </p:extLst>
+          </p:nvPr>
+        </p:nvSpPr>
+        <p:spPr>
+          <a:xfrm>
+            <a:off x="0" y="0"/>
+            <a:ext cx="12192000" cy="6858000"/>
+          </a:xfrm>
+          <a:prstGeom prst="rect">
+            <a:avLst/>
+          </a:prstGeom>
+          <a:solidFill>
+            <a:schemeClr val="bg2"/>
+          </a:solidFill>
+          <a:ln>
+            <a:noFill/>
+          </a:ln>
+        </p:spPr>
+        <p:style>
+          <a:lnRef idx="2">
+            <a:schemeClr val="accent1">
+              <a:shade val="50000"/>
+            </a:schemeClr>
+          </a:lnRef>
+          <a:fillRef idx="1">
+            <a:schemeClr val="accent1"/>
+          </a:fillRef>
+          <a:effectRef idx="0">
+            <a:schemeClr val="accent1"/>
+          </a:effectRef>
+          <a:fontRef idx="minor">
+            <a:schemeClr val="lt1"/>
+          </a:fontRef>
+        </p:style>
+        <p:txBody>
+          <a:bodyPr rtlCol="0" anchor="ctr"/>
+          <a:lstStyle/>
+          <a:p>
+            <a:pPr algn="ctr"/>
+            <a:endParaRPr lang="en-US"/>
+          </a:p>
+        </p:txBody>
+      </p:sp>
+      <p:sp>
+        <p:nvSpPr>
+          <p:cNvPr id="12" name="Rectangle 11">
+            <a:extLst>
+              <a:ext uri="{FF2B5EF4-FFF2-40B4-BE49-F238E27FC236}">
+                <a16:creationId xmlns:a16="http://schemas.microsoft.com/office/drawing/2014/main" id="{1855405F-37A2-4869-9154-F8BE3BECE6C3}"/>
+              </a:ext>
+              <a:ext uri="{C183D7F6-B498-43B3-948B-1728B52AA6E4}">
+                <adec:decorative xmlns:adec="http://schemas.microsoft.com/office/drawing/2017/decorative" val="1"/>
+              </a:ext>
+            </a:extLst>
+          </p:cNvPr>
+          <p:cNvSpPr>
+            <a:spLocks noGrp="1" noRot="1" noChangeAspect="1" noMove="1" noResize="1" noEditPoints="1" noAdjustHandles="1" noChangeArrowheads="1" noChangeShapeType="1" noTextEdit="1"/>
+          </p:cNvSpPr>
+          <p:nvPr>
+            <p:extLst>
+              <p:ext uri="{386F3935-93C4-4BCD-93E2-E3B085C9AB24}">
+                <p16:designElem xmlns:p16="http://schemas.microsoft.com/office/powerpoint/2015/main" val="1"/>
+              </p:ext>
+            </p:extLst>
+          </p:nvPr>
+        </p:nvSpPr>
+        <p:spPr>
+          <a:xfrm>
+            <a:off x="477012" y="480060"/>
+            <a:ext cx="11237976" cy="5897880"/>
+          </a:xfrm>
+          <a:prstGeom prst="rect">
+            <a:avLst/>
+          </a:prstGeom>
+          <a:solidFill>
+            <a:srgbClr val="FFFFFF"/>
+          </a:solidFill>
+          <a:ln w="9525">
+            <a:noFill/>
+          </a:ln>
+          <a:effectLst>
+            <a:outerShdw blurRad="63500" dist="17780" dir="5400000" algn="t" rotWithShape="0">
+              <a:prstClr val="black">
+                <a:alpha val="43000"/>
+              </a:prstClr>
+            </a:outerShdw>
+          </a:effectLst>
+        </p:spPr>
+        <p:style>
+          <a:lnRef idx="2">
+            <a:schemeClr val="accent1">
+              <a:shade val="50000"/>
+            </a:schemeClr>
+          </a:lnRef>
+          <a:fillRef idx="1">
+            <a:schemeClr val="accent1"/>
+          </a:fillRef>
+          <a:effectRef idx="0">
+            <a:schemeClr val="accent1"/>
+          </a:effectRef>
+          <a:fontRef idx="minor">
+            <a:schemeClr val="lt1"/>
+          </a:fontRef>
+        </p:style>
+        <p:txBody>
+          <a:bodyPr rtlCol="0" anchor="ctr"/>
+          <a:lstStyle/>
+          <a:p>
+            <a:pPr algn="ctr"/>
+            <a:endParaRPr lang="en-US"/>
+          </a:p>
+        </p:txBody>
+      </p:sp>
+      <p:pic>
+        <p:nvPicPr>
+          <p:cNvPr id="5" name="Content Placeholder 4">
+            <a:extLst>
+              <a:ext uri="{FF2B5EF4-FFF2-40B4-BE49-F238E27FC236}">
+                <a16:creationId xmlns:a16="http://schemas.microsoft.com/office/drawing/2014/main" id="{C869C555-A0E6-4882-B94C-66EAF7BA6C1C}"/>
+              </a:ext>
+            </a:extLst>
+          </p:cNvPr>
+          <p:cNvPicPr>
+            <a:picLocks noGrp="1" noChangeAspect="1"/>
+          </p:cNvPicPr>
+          <p:nvPr>
+            <p:ph idx="1"/>
+          </p:nvPr>
+        </p:nvPicPr>
+        <p:blipFill>
+          <a:blip r:embed="rId2">
+            <a:extLst>
+              <a:ext uri="{28A0092B-C50C-407E-A947-70E740481C1C}">
+                <a14:useLocalDpi xmlns:a14="http://schemas.microsoft.com/office/drawing/2010/main" val="0"/>
+              </a:ext>
+            </a:extLst>
+          </a:blip>
+          <a:stretch>
+            <a:fillRect/>
+          </a:stretch>
+        </p:blipFill>
+        <p:spPr>
+          <a:xfrm>
+            <a:off x="5239408" y="738553"/>
+            <a:ext cx="4265077" cy="5380892"/>
+          </a:xfrm>
+          <a:prstGeom prst="rect">
+            <a:avLst/>
+          </a:prstGeom>
+        </p:spPr>
+      </p:pic>
+      <p:sp>
+        <p:nvSpPr>
+          <p:cNvPr id="6" name="TextBox 5">
+            <a:extLst>
+              <a:ext uri="{FF2B5EF4-FFF2-40B4-BE49-F238E27FC236}">
+                <a16:creationId xmlns:a16="http://schemas.microsoft.com/office/drawing/2014/main" id="{C2571544-1E65-4830-AD62-91704AE4A113}"/>
+              </a:ext>
+            </a:extLst>
+          </p:cNvPr>
+          <p:cNvSpPr txBox="1"/>
+          <p:nvPr/>
+        </p:nvSpPr>
+        <p:spPr>
+          <a:xfrm>
+            <a:off x="1915655" y="2828835"/>
+            <a:ext cx="2846741" cy="1200329"/>
+          </a:xfrm>
+          <a:prstGeom prst="rect">
+            <a:avLst/>
+          </a:prstGeom>
+          <a:noFill/>
+        </p:spPr>
+        <p:txBody>
+          <a:bodyPr wrap="none" rtlCol="0">
+            <a:spAutoFit/>
+          </a:bodyPr>
+          <a:lstStyle/>
+          <a:p>
+            <a:pPr algn="ctr"/>
+            <a:r>
+              <a:rPr lang="en-US" sz="2400" dirty="0"/>
+              <a:t>Architecture Diagram</a:t>
+            </a:r>
+          </a:p>
+          <a:p>
+            <a:pPr algn="ctr"/>
+            <a:r>
+              <a:rPr lang="en-US" sz="2400" dirty="0"/>
+              <a:t>+</a:t>
+            </a:r>
+          </a:p>
+          <a:p>
+            <a:pPr algn="ctr"/>
+            <a:r>
+              <a:rPr lang="en-US" sz="2400" dirty="0"/>
+              <a:t>Technology Stack</a:t>
+            </a:r>
+          </a:p>
+        </p:txBody>
+      </p:sp>
+    </p:spTree>
+    <p:extLst>
+      <p:ext uri="{BB962C8B-B14F-4D97-AF65-F5344CB8AC3E}">
+        <p14:creationId xmlns:p14="http://schemas.microsoft.com/office/powerpoint/2010/main" val="2598497886"/>
+      </p:ext>
+    </p:extLst>
+  </p:cSld>
+  <p:clrMapOvr>
+    <a:masterClrMapping/>
+  </p:clrMapOvr>
+  <p:transition>
+    <p:push dir="u"/>
+  </p:transition>
+</p:sld>
+</file>
+
+<file path=ppt/slides/slide5.xml><?xml version="1.0" encoding="utf-8"?>
+<p:sld xmlns:a="http://schemas.openxmlformats.org/drawingml/2006/main" xmlns:r="http://schemas.openxmlformats.org/officeDocument/2006/relationships" xmlns:p="http://schemas.openxmlformats.org/presentationml/2006/main">
+  <p:cSld>
+    <p:bg>
+      <p:bgPr>
+        <a:solidFill>
+          <a:schemeClr val="bg1"/>
+        </a:solidFill>
+        <a:effectLst/>
+      </p:bgPr>
+    </p:bg>
+    <p:spTree>
+      <p:nvGrpSpPr>
+        <p:cNvPr id="1" name=""/>
+        <p:cNvGrpSpPr/>
+        <p:nvPr/>
+      </p:nvGrpSpPr>
+      <p:grpSpPr>
+        <a:xfrm>
+          <a:off x="0" y="0"/>
+          <a:ext cx="0" cy="0"/>
+          <a:chOff x="0" y="0"/>
+          <a:chExt cx="0" cy="0"/>
+        </a:xfrm>
+      </p:grpSpPr>
+      <p:pic>
+        <p:nvPicPr>
+          <p:cNvPr id="5" name="Content Placeholder 4">
+            <a:extLst>
+              <a:ext uri="{FF2B5EF4-FFF2-40B4-BE49-F238E27FC236}">
+                <a16:creationId xmlns:a16="http://schemas.microsoft.com/office/drawing/2014/main" id="{68E654F1-D977-4CA9-A025-1D867297012B}"/>
+              </a:ext>
+            </a:extLst>
+          </p:cNvPr>
+          <p:cNvPicPr>
+            <a:picLocks noGrp="1" noChangeAspect="1"/>
+          </p:cNvPicPr>
+          <p:nvPr>
+            <p:ph idx="1"/>
+          </p:nvPr>
+        </p:nvPicPr>
+        <p:blipFill>
+          <a:blip r:embed="rId2">
+            <a:extLst>
+              <a:ext uri="{28A0092B-C50C-407E-A947-70E740481C1C}">
+                <a14:useLocalDpi xmlns:a14="http://schemas.microsoft.com/office/drawing/2010/main" val="0"/>
+              </a:ext>
+            </a:extLst>
+          </a:blip>
+          <a:stretch>
+            <a:fillRect/>
+          </a:stretch>
+        </p:blipFill>
+        <p:spPr>
+          <a:xfrm>
+            <a:off x="1893494" y="656233"/>
+            <a:ext cx="8405011" cy="5545534"/>
+          </a:xfrm>
+          <a:prstGeom prst="rect">
+            <a:avLst/>
+          </a:prstGeom>
+        </p:spPr>
+      </p:pic>
+    </p:spTree>
+    <p:extLst>
+      <p:ext uri="{BB962C8B-B14F-4D97-AF65-F5344CB8AC3E}">
+        <p14:creationId xmlns:p14="http://schemas.microsoft.com/office/powerpoint/2010/main" val="2113585542"/>
+      </p:ext>
+    </p:extLst>
+  </p:cSld>
+  <p:clrMapOvr>
+    <a:masterClrMapping/>
+  </p:clrMapOvr>
+  <p:transition>
+    <p:push dir="u"/>
+  </p:transition>
+</p:sld>
+</file>
+
+<file path=ppt/slides/slide6.xml><?xml version="1.0" encoding="utf-8"?>
+<p:sld xmlns:a="http://schemas.openxmlformats.org/drawingml/2006/main" xmlns:r="http://schemas.openxmlformats.org/officeDocument/2006/relationships" xmlns:p="http://schemas.openxmlformats.org/presentationml/2006/main">
+  <p:cSld>
+    <p:spTree>
+      <p:nvGrpSpPr>
+        <p:cNvPr id="1" name=""/>
+        <p:cNvGrpSpPr/>
+        <p:nvPr/>
+      </p:nvGrpSpPr>
+      <p:grpSpPr>
+        <a:xfrm>
+          <a:off x="0" y="0"/>
+          <a:ext cx="0" cy="0"/>
+          <a:chOff x="0" y="0"/>
+          <a:chExt cx="0" cy="0"/>
+        </a:xfrm>
+      </p:grpSpPr>
+      <p:pic>
+        <p:nvPicPr>
+          <p:cNvPr id="5" name="Content Placeholder 4">
+            <a:extLst>
+              <a:ext uri="{FF2B5EF4-FFF2-40B4-BE49-F238E27FC236}">
+                <a16:creationId xmlns:a16="http://schemas.microsoft.com/office/drawing/2014/main" id="{6A25C629-7DB1-4E47-83BC-73044ED85EE6}"/>
+              </a:ext>
+            </a:extLst>
+          </p:cNvPr>
+          <p:cNvPicPr>
+            <a:picLocks noGrp="1" noChangeAspect="1"/>
+          </p:cNvPicPr>
+          <p:nvPr>
+            <p:ph idx="1"/>
+          </p:nvPr>
+        </p:nvPicPr>
+        <p:blipFill>
+          <a:blip r:embed="rId2">
+            <a:extLst>
+              <a:ext uri="{28A0092B-C50C-407E-A947-70E740481C1C}">
+                <a14:useLocalDpi xmlns:a14="http://schemas.microsoft.com/office/drawing/2010/main" val="0"/>
+              </a:ext>
+            </a:extLst>
+          </a:blip>
+          <a:stretch>
+            <a:fillRect/>
+          </a:stretch>
+        </p:blipFill>
+        <p:spPr>
+          <a:xfrm>
+            <a:off x="1135539" y="2554050"/>
+            <a:ext cx="9920921" cy="1749900"/>
+          </a:xfrm>
+        </p:spPr>
+      </p:pic>
+      <p:sp>
+        <p:nvSpPr>
+          <p:cNvPr id="6" name="TextBox 5">
+            <a:extLst>
+              <a:ext uri="{FF2B5EF4-FFF2-40B4-BE49-F238E27FC236}">
+                <a16:creationId xmlns:a16="http://schemas.microsoft.com/office/drawing/2014/main" id="{79032C22-F76E-4730-AADC-F75256F3B71E}"/>
+              </a:ext>
+            </a:extLst>
+          </p:cNvPr>
+          <p:cNvSpPr txBox="1"/>
+          <p:nvPr/>
+        </p:nvSpPr>
+        <p:spPr>
+          <a:xfrm>
+            <a:off x="6208786" y="708432"/>
+            <a:ext cx="4847674" cy="707886"/>
+          </a:xfrm>
+          <a:prstGeom prst="rect">
+            <a:avLst/>
+          </a:prstGeom>
+          <a:noFill/>
+        </p:spPr>
+        <p:txBody>
+          <a:bodyPr wrap="none" rtlCol="0">
+            <a:spAutoFit/>
+          </a:bodyPr>
+          <a:lstStyle/>
+          <a:p>
+            <a:r>
+              <a:rPr lang="en-US" sz="4000" dirty="0"/>
+              <a:t>Collaboration Diagram</a:t>
+            </a:r>
+          </a:p>
+        </p:txBody>
+      </p:sp>
+    </p:spTree>
+    <p:extLst>
+      <p:ext uri="{BB962C8B-B14F-4D97-AF65-F5344CB8AC3E}">
+        <p14:creationId xmlns:p14="http://schemas.microsoft.com/office/powerpoint/2010/main" val="1039725118"/>
+      </p:ext>
+    </p:extLst>
+  </p:cSld>
+  <p:clrMapOvr>
+    <a:masterClrMapping/>
+  </p:clrMapOvr>
+  <p:transition>
+    <p:push dir="u"/>
+  </p:transition>
+</p:sld>
+</file>
+
+<file path=ppt/slides/slide7.xml><?xml version="1.0" encoding="utf-8"?>
+<p:sld xmlns:a="http://schemas.openxmlformats.org/drawingml/2006/main" xmlns:r="http://schemas.openxmlformats.org/officeDocument/2006/relationships" xmlns:p="http://schemas.openxmlformats.org/presentationml/2006/main">
+  <p:cSld>
+    <p:spTree>
+      <p:nvGrpSpPr>
+        <p:cNvPr id="1" name=""/>
+        <p:cNvGrpSpPr/>
+        <p:nvPr/>
+      </p:nvGrpSpPr>
+      <p:grpSpPr>
+        <a:xfrm>
+          <a:off x="0" y="0"/>
+          <a:ext cx="0" cy="0"/>
+          <a:chOff x="0" y="0"/>
+          <a:chExt cx="0" cy="0"/>
+        </a:xfrm>
+      </p:grpSpPr>
+      <p:pic>
+        <p:nvPicPr>
+          <p:cNvPr id="5" name="Content Placeholder 4">
+            <a:extLst>
+              <a:ext uri="{FF2B5EF4-FFF2-40B4-BE49-F238E27FC236}">
+                <a16:creationId xmlns:a16="http://schemas.microsoft.com/office/drawing/2014/main" id="{AEC13352-9598-434A-8F96-21A0FAD4CA68}"/>
+              </a:ext>
+            </a:extLst>
+          </p:cNvPr>
+          <p:cNvPicPr>
+            <a:picLocks noGrp="1" noChangeAspect="1"/>
+          </p:cNvPicPr>
+          <p:nvPr>
+            <p:ph idx="1"/>
+          </p:nvPr>
+        </p:nvPicPr>
+        <p:blipFill>
+          <a:blip r:embed="rId2">
+            <a:extLst>
+              <a:ext uri="{28A0092B-C50C-407E-A947-70E740481C1C}">
+                <a14:useLocalDpi xmlns:a14="http://schemas.microsoft.com/office/drawing/2010/main" val="0"/>
+              </a:ext>
+            </a:extLst>
+          </a:blip>
+          <a:stretch>
+            <a:fillRect/>
+          </a:stretch>
+        </p:blipFill>
+        <p:spPr>
+          <a:xfrm>
+            <a:off x="254977" y="79131"/>
+            <a:ext cx="11843238" cy="6778869"/>
+          </a:xfrm>
+        </p:spPr>
+      </p:pic>
+      <p:sp>
+        <p:nvSpPr>
+          <p:cNvPr id="6" name="TextBox 5">
+            <a:extLst>
+              <a:ext uri="{FF2B5EF4-FFF2-40B4-BE49-F238E27FC236}">
+                <a16:creationId xmlns:a16="http://schemas.microsoft.com/office/drawing/2014/main" id="{BE5DC734-9B99-49B1-BD72-C46D098BDDF9}"/>
+              </a:ext>
+            </a:extLst>
+          </p:cNvPr>
+          <p:cNvSpPr txBox="1"/>
+          <p:nvPr/>
+        </p:nvSpPr>
+        <p:spPr>
+          <a:xfrm>
+            <a:off x="7791908" y="847470"/>
+            <a:ext cx="3197414" cy="707886"/>
+          </a:xfrm>
+          <a:prstGeom prst="rect">
+            <a:avLst/>
+          </a:prstGeom>
+          <a:noFill/>
+        </p:spPr>
+        <p:txBody>
+          <a:bodyPr wrap="none" rtlCol="0">
+            <a:spAutoFit/>
+          </a:bodyPr>
+          <a:lstStyle/>
+          <a:p>
+            <a:r>
+              <a:rPr lang="en-US" sz="4000" dirty="0"/>
+              <a:t>Class Diagram</a:t>
+            </a:r>
+          </a:p>
+        </p:txBody>
+      </p:sp>
+    </p:spTree>
+    <p:extLst>
+      <p:ext uri="{BB962C8B-B14F-4D97-AF65-F5344CB8AC3E}">
+        <p14:creationId xmlns:p14="http://schemas.microsoft.com/office/powerpoint/2010/main" val="2777314522"/>
+      </p:ext>
+    </p:extLst>
+  </p:cSld>
+  <p:clrMapOvr>
+    <a:masterClrMapping/>
+  </p:clrMapOvr>
+  <p:transition>
+    <p:push dir="u"/>
+  </p:transition>
+</p:sld>
+</file>
+
+<file path=ppt/slides/slide8.xml><?xml version="1.0" encoding="utf-8"?>
+<p:sld xmlns:a="http://schemas.openxmlformats.org/drawingml/2006/main" xmlns:r="http://schemas.openxmlformats.org/officeDocument/2006/relationships" xmlns:p="http://schemas.openxmlformats.org/presentationml/2006/main">
+  <p:cSld>
+    <p:spTree>
+      <p:nvGrpSpPr>
+        <p:cNvPr id="1" name=""/>
+        <p:cNvGrpSpPr/>
+        <p:nvPr/>
+      </p:nvGrpSpPr>
+      <p:grpSpPr>
+        <a:xfrm>
+          <a:off x="0" y="0"/>
+          <a:ext cx="0" cy="0"/>
+          <a:chOff x="0" y="0"/>
+          <a:chExt cx="0" cy="0"/>
+        </a:xfrm>
+      </p:grpSpPr>
+      <p:sp>
+        <p:nvSpPr>
+          <p:cNvPr id="4" name="Title 3">
+            <a:extLst>
+              <a:ext uri="{FF2B5EF4-FFF2-40B4-BE49-F238E27FC236}">
+                <a16:creationId xmlns:a16="http://schemas.microsoft.com/office/drawing/2014/main" id="{41C16394-68E6-477A-BEF3-E9974515A288}"/>
+              </a:ext>
+            </a:extLst>
+          </p:cNvPr>
+          <p:cNvSpPr>
+            <a:spLocks noGrp="1"/>
+          </p:cNvSpPr>
+          <p:nvPr>
+            <p:ph type="title"/>
+          </p:nvPr>
+        </p:nvSpPr>
+        <p:spPr/>
+        <p:txBody>
+          <a:bodyPr/>
+          <a:lstStyle/>
+          <a:p>
+            <a:pPr algn="ctr"/>
+            <a:r>
+              <a:rPr lang="en-US" sz="11500" dirty="0"/>
+              <a:t>demo</a:t>
+            </a:r>
+            <a:endParaRPr lang="en-US" dirty="0"/>
+          </a:p>
+        </p:txBody>
+      </p:sp>
+      <p:sp>
+        <p:nvSpPr>
+          <p:cNvPr id="5" name="Text Placeholder 4">
+            <a:extLst>
+              <a:ext uri="{FF2B5EF4-FFF2-40B4-BE49-F238E27FC236}">
+                <a16:creationId xmlns:a16="http://schemas.microsoft.com/office/drawing/2014/main" id="{82DF313E-38EE-4BA7-B232-2051112D761A}"/>
+              </a:ext>
+            </a:extLst>
+          </p:cNvPr>
+          <p:cNvSpPr>
+            <a:spLocks noGrp="1"/>
+          </p:cNvSpPr>
+          <p:nvPr>
+            <p:ph type="body" idx="1"/>
+          </p:nvPr>
+        </p:nvSpPr>
+        <p:spPr/>
+        <p:txBody>
+          <a:bodyPr/>
+          <a:lstStyle/>
+          <a:p>
+            <a:pPr algn="ctr"/>
+            <a:endParaRPr lang="en-US" dirty="0"/>
+          </a:p>
+        </p:txBody>
+      </p:sp>
+    </p:spTree>
+    <p:extLst>
+      <p:ext uri="{BB962C8B-B14F-4D97-AF65-F5344CB8AC3E}">
+        <p14:creationId xmlns:p14="http://schemas.microsoft.com/office/powerpoint/2010/main" val="1252393059"/>
+      </p:ext>
+    </p:extLst>
+  </p:cSld>
+  <p:clrMapOvr>
+    <a:masterClrMapping/>
+  </p:clrMapOvr>
+  <p:transition spd="slow">
+    <p:push dir="u"/>
+  </p:transition>
+</p:sld>
+</file>
+
+<file path=ppt/slides/slide9.xml><?xml version="1.0" encoding="utf-8"?>
 <p:sld xmlns:a="http://schemas.openxmlformats.org/drawingml/2006/main" xmlns:r="http://schemas.openxmlformats.org/officeDocument/2006/relationships" xmlns:p="http://schemas.openxmlformats.org/presentationml/2006/main">
   <p:cSld>
     <p:bg>
@@ -4566,1297 +5776,6 @@
     <p:extLst>
       <p:ext uri="{BB962C8B-B14F-4D97-AF65-F5344CB8AC3E}">
         <p14:creationId xmlns:p14="http://schemas.microsoft.com/office/powerpoint/2010/main" val="2863624058"/>
-      </p:ext>
-    </p:extLst>
-  </p:cSld>
-  <p:clrMapOvr>
-    <a:masterClrMapping/>
-  </p:clrMapOvr>
-  <p:transition spd="slow">
-    <p:push dir="u"/>
-  </p:transition>
-</p:sld>
-</file>
-
-<file path=ppt/slides/slide2.xml><?xml version="1.0" encoding="utf-8"?>
-<p:sld xmlns:a="http://schemas.openxmlformats.org/drawingml/2006/main" xmlns:r="http://schemas.openxmlformats.org/officeDocument/2006/relationships" xmlns:p="http://schemas.openxmlformats.org/presentationml/2006/main">
-  <p:cSld>
-    <p:spTree>
-      <p:nvGrpSpPr>
-        <p:cNvPr id="1" name=""/>
-        <p:cNvGrpSpPr/>
-        <p:nvPr/>
-      </p:nvGrpSpPr>
-      <p:grpSpPr>
-        <a:xfrm>
-          <a:off x="0" y="0"/>
-          <a:ext cx="0" cy="0"/>
-          <a:chOff x="0" y="0"/>
-          <a:chExt cx="0" cy="0"/>
-        </a:xfrm>
-      </p:grpSpPr>
-      <p:sp>
-        <p:nvSpPr>
-          <p:cNvPr id="2" name="Title 1">
-            <a:extLst>
-              <a:ext uri="{FF2B5EF4-FFF2-40B4-BE49-F238E27FC236}">
-                <a16:creationId xmlns:a16="http://schemas.microsoft.com/office/drawing/2014/main" id="{9F5CF64A-EA29-436F-9069-EBA18DF66A1B}"/>
-              </a:ext>
-            </a:extLst>
-          </p:cNvPr>
-          <p:cNvSpPr>
-            <a:spLocks noGrp="1"/>
-          </p:cNvSpPr>
-          <p:nvPr>
-            <p:ph type="title"/>
-          </p:nvPr>
-        </p:nvSpPr>
-        <p:spPr/>
-        <p:txBody>
-          <a:bodyPr/>
-          <a:lstStyle/>
-          <a:p>
-            <a:endParaRPr lang="en-US"/>
-          </a:p>
-        </p:txBody>
-      </p:sp>
-      <p:sp>
-        <p:nvSpPr>
-          <p:cNvPr id="3" name="Content Placeholder 2">
-            <a:extLst>
-              <a:ext uri="{FF2B5EF4-FFF2-40B4-BE49-F238E27FC236}">
-                <a16:creationId xmlns:a16="http://schemas.microsoft.com/office/drawing/2014/main" id="{183DF000-1DAA-4B24-B895-3A717A121100}"/>
-              </a:ext>
-            </a:extLst>
-          </p:cNvPr>
-          <p:cNvSpPr>
-            <a:spLocks noGrp="1"/>
-          </p:cNvSpPr>
-          <p:nvPr>
-            <p:ph idx="1"/>
-          </p:nvPr>
-        </p:nvSpPr>
-        <p:spPr/>
-        <p:txBody>
-          <a:bodyPr>
-            <a:normAutofit/>
-          </a:bodyPr>
-          <a:lstStyle/>
-          <a:p>
-            <a:pPr marL="0" indent="0">
-              <a:buNone/>
-            </a:pPr>
-            <a:endParaRPr lang="en-US" sz="5400" dirty="0"/>
-          </a:p>
-          <a:p>
-            <a:pPr marL="0" indent="0">
-              <a:buNone/>
-            </a:pPr>
-            <a:r>
-              <a:rPr lang="en-US" sz="5400" dirty="0"/>
-              <a:t>    https://mum-life.herokuapp.com</a:t>
-            </a:r>
-          </a:p>
-        </p:txBody>
-      </p:sp>
-    </p:spTree>
-    <p:extLst>
-      <p:ext uri="{BB962C8B-B14F-4D97-AF65-F5344CB8AC3E}">
-        <p14:creationId xmlns:p14="http://schemas.microsoft.com/office/powerpoint/2010/main" val="3744593640"/>
-      </p:ext>
-    </p:extLst>
-  </p:cSld>
-  <p:clrMapOvr>
-    <a:masterClrMapping/>
-  </p:clrMapOvr>
-  <p:transition spd="slow">
-    <p:push dir="u"/>
-  </p:transition>
-</p:sld>
-</file>
-
-<file path=ppt/slides/slide3.xml><?xml version="1.0" encoding="utf-8"?>
-<p:sld xmlns:a="http://schemas.openxmlformats.org/drawingml/2006/main" xmlns:r="http://schemas.openxmlformats.org/officeDocument/2006/relationships" xmlns:p="http://schemas.openxmlformats.org/presentationml/2006/main">
-  <p:cSld>
-    <p:spTree>
-      <p:nvGrpSpPr>
-        <p:cNvPr id="1" name=""/>
-        <p:cNvGrpSpPr/>
-        <p:nvPr/>
-      </p:nvGrpSpPr>
-      <p:grpSpPr>
-        <a:xfrm>
-          <a:off x="0" y="0"/>
-          <a:ext cx="0" cy="0"/>
-          <a:chOff x="0" y="0"/>
-          <a:chExt cx="0" cy="0"/>
-        </a:xfrm>
-      </p:grpSpPr>
-      <p:sp>
-        <p:nvSpPr>
-          <p:cNvPr id="2" name="Title 1">
-            <a:extLst>
-              <a:ext uri="{FF2B5EF4-FFF2-40B4-BE49-F238E27FC236}">
-                <a16:creationId xmlns:a16="http://schemas.microsoft.com/office/drawing/2014/main" id="{D4527414-61B0-4CE2-B254-637FCC18EBF7}"/>
-              </a:ext>
-            </a:extLst>
-          </p:cNvPr>
-          <p:cNvSpPr>
-            <a:spLocks noGrp="1"/>
-          </p:cNvSpPr>
-          <p:nvPr>
-            <p:ph type="title"/>
-          </p:nvPr>
-        </p:nvSpPr>
-        <p:spPr/>
-        <p:txBody>
-          <a:bodyPr/>
-          <a:lstStyle/>
-          <a:p>
-            <a:r>
-              <a:rPr lang="en-US" dirty="0"/>
-              <a:t>Problem Statement</a:t>
-            </a:r>
-          </a:p>
-        </p:txBody>
-      </p:sp>
-      <p:sp>
-        <p:nvSpPr>
-          <p:cNvPr id="3" name="Content Placeholder 2">
-            <a:extLst>
-              <a:ext uri="{FF2B5EF4-FFF2-40B4-BE49-F238E27FC236}">
-                <a16:creationId xmlns:a16="http://schemas.microsoft.com/office/drawing/2014/main" id="{14E6595D-448A-41E4-AC76-D00EB0C3C119}"/>
-              </a:ext>
-            </a:extLst>
-          </p:cNvPr>
-          <p:cNvSpPr>
-            <a:spLocks noGrp="1"/>
-          </p:cNvSpPr>
-          <p:nvPr>
-            <p:ph idx="1"/>
-          </p:nvPr>
-        </p:nvSpPr>
-        <p:spPr/>
-        <p:txBody>
-          <a:bodyPr>
-            <a:normAutofit/>
-          </a:bodyPr>
-          <a:lstStyle/>
-          <a:p>
-            <a:endParaRPr lang="en-US" dirty="0"/>
-          </a:p>
-          <a:p>
-            <a:r>
-              <a:rPr lang="en-US" dirty="0"/>
-              <a:t>Managing and Renting items from the Recreation Center. </a:t>
-            </a:r>
-          </a:p>
-          <a:p>
-            <a:endParaRPr lang="en-US" dirty="0"/>
-          </a:p>
-          <a:p>
-            <a:endParaRPr lang="en-US" dirty="0"/>
-          </a:p>
-          <a:p>
-            <a:r>
-              <a:rPr lang="en-US" dirty="0"/>
-              <a:t>Managing and Getting information about events. </a:t>
-            </a:r>
-          </a:p>
-          <a:p>
-            <a:endParaRPr lang="en-US" dirty="0"/>
-          </a:p>
-        </p:txBody>
-      </p:sp>
-    </p:spTree>
-    <p:extLst>
-      <p:ext uri="{BB962C8B-B14F-4D97-AF65-F5344CB8AC3E}">
-        <p14:creationId xmlns:p14="http://schemas.microsoft.com/office/powerpoint/2010/main" val="1721247881"/>
-      </p:ext>
-    </p:extLst>
-  </p:cSld>
-  <p:clrMapOvr>
-    <a:masterClrMapping/>
-  </p:clrMapOvr>
-  <p:transition>
-    <p:push dir="u"/>
-  </p:transition>
-</p:sld>
-</file>
-
-<file path=ppt/slides/slide4.xml><?xml version="1.0" encoding="utf-8"?>
-<p:sld xmlns:a="http://schemas.openxmlformats.org/drawingml/2006/main" xmlns:r="http://schemas.openxmlformats.org/officeDocument/2006/relationships" xmlns:p="http://schemas.openxmlformats.org/presentationml/2006/main">
-  <p:cSld>
-    <p:bg>
-      <p:bgPr>
-        <a:solidFill>
-          <a:schemeClr val="bg1"/>
-        </a:solidFill>
-        <a:effectLst/>
-      </p:bgPr>
-    </p:bg>
-    <p:spTree>
-      <p:nvGrpSpPr>
-        <p:cNvPr id="1" name=""/>
-        <p:cNvGrpSpPr/>
-        <p:nvPr/>
-      </p:nvGrpSpPr>
-      <p:grpSpPr>
-        <a:xfrm>
-          <a:off x="0" y="0"/>
-          <a:ext cx="0" cy="0"/>
-          <a:chOff x="0" y="0"/>
-          <a:chExt cx="0" cy="0"/>
-        </a:xfrm>
-      </p:grpSpPr>
-      <p:sp>
-        <p:nvSpPr>
-          <p:cNvPr id="12" name="Rectangle 11">
-            <a:extLst>
-              <a:ext uri="{FF2B5EF4-FFF2-40B4-BE49-F238E27FC236}">
-                <a16:creationId xmlns:a16="http://schemas.microsoft.com/office/drawing/2014/main" id="{57845966-6EFC-468A-9CC7-BAB4B95854E7}"/>
-              </a:ext>
-              <a:ext uri="{C183D7F6-B498-43B3-948B-1728B52AA6E4}">
-                <adec:decorative xmlns:adec="http://schemas.microsoft.com/office/drawing/2017/decorative" val="1"/>
-              </a:ext>
-            </a:extLst>
-          </p:cNvPr>
-          <p:cNvSpPr>
-            <a:spLocks noGrp="1" noRot="1" noChangeAspect="1" noMove="1" noResize="1" noEditPoints="1" noAdjustHandles="1" noChangeArrowheads="1" noChangeShapeType="1" noTextEdit="1"/>
-          </p:cNvSpPr>
-          <p:nvPr>
-            <p:extLst>
-              <p:ext uri="{386F3935-93C4-4BCD-93E2-E3B085C9AB24}">
-                <p16:designElem xmlns:p16="http://schemas.microsoft.com/office/powerpoint/2015/main" val="1"/>
-              </p:ext>
-            </p:extLst>
-          </p:nvPr>
-        </p:nvSpPr>
-        <p:spPr>
-          <a:xfrm>
-            <a:off x="1354372" y="0"/>
-            <a:ext cx="9483256" cy="6858000"/>
-          </a:xfrm>
-          <a:prstGeom prst="rect">
-            <a:avLst/>
-          </a:prstGeom>
-          <a:gradFill>
-            <a:gsLst>
-              <a:gs pos="0">
-                <a:schemeClr val="accent1">
-                  <a:lumMod val="100000"/>
-                  <a:alpha val="82000"/>
-                </a:schemeClr>
-              </a:gs>
-              <a:gs pos="25000">
-                <a:schemeClr val="accent1">
-                  <a:alpha val="60000"/>
-                </a:schemeClr>
-              </a:gs>
-              <a:gs pos="94000">
-                <a:schemeClr val="bg2">
-                  <a:lumMod val="75000"/>
-                </a:schemeClr>
-              </a:gs>
-              <a:gs pos="100000">
-                <a:schemeClr val="bg2">
-                  <a:lumMod val="75000"/>
-                </a:schemeClr>
-              </a:gs>
-            </a:gsLst>
-            <a:lin ang="4200000" scaled="0"/>
-          </a:gradFill>
-          <a:ln>
-            <a:noFill/>
-          </a:ln>
-        </p:spPr>
-        <p:style>
-          <a:lnRef idx="2">
-            <a:schemeClr val="accent1">
-              <a:shade val="50000"/>
-            </a:schemeClr>
-          </a:lnRef>
-          <a:fillRef idx="1">
-            <a:schemeClr val="accent1"/>
-          </a:fillRef>
-          <a:effectRef idx="0">
-            <a:schemeClr val="accent1"/>
-          </a:effectRef>
-          <a:fontRef idx="minor">
-            <a:schemeClr val="lt1"/>
-          </a:fontRef>
-        </p:style>
-        <p:txBody>
-          <a:bodyPr rtlCol="0" anchor="ctr"/>
-          <a:lstStyle/>
-          <a:p>
-            <a:pPr algn="ctr"/>
-            <a:endParaRPr lang="en-US"/>
-          </a:p>
-        </p:txBody>
-      </p:sp>
-      <p:pic>
-        <p:nvPicPr>
-          <p:cNvPr id="14" name="Picture 13">
-            <a:extLst>
-              <a:ext uri="{FF2B5EF4-FFF2-40B4-BE49-F238E27FC236}">
-                <a16:creationId xmlns:a16="http://schemas.microsoft.com/office/drawing/2014/main" id="{75554383-98AF-4A47-BB65-705FAAA4BE6A}"/>
-              </a:ext>
-              <a:ext uri="{C183D7F6-B498-43B3-948B-1728B52AA6E4}">
-                <adec:decorative xmlns:adec="http://schemas.microsoft.com/office/drawing/2017/decorative" val="1"/>
-              </a:ext>
-            </a:extLst>
-          </p:cNvPr>
-          <p:cNvPicPr>
-            <a:picLocks noGrp="1" noRot="1" noChangeAspect="1" noMove="1" noResize="1" noEditPoints="1" noAdjustHandles="1" noChangeArrowheads="1" noChangeShapeType="1" noCrop="1"/>
-          </p:cNvPicPr>
-          <p:nvPr>
-            <p:extLst>
-              <p:ext uri="{386F3935-93C4-4BCD-93E2-E3B085C9AB24}">
-                <p16:designElem xmlns:p16="http://schemas.microsoft.com/office/powerpoint/2015/main" val="1"/>
-              </p:ext>
-            </p:extLst>
-          </p:nvPr>
-        </p:nvPicPr>
-        <p:blipFill>
-          <a:blip r:embed="rId2">
-            <a:extLst>
-              <a:ext uri="{28A0092B-C50C-407E-A947-70E740481C1C}">
-                <a14:useLocalDpi xmlns:a14="http://schemas.microsoft.com/office/drawing/2010/main" val="0"/>
-              </a:ext>
-            </a:extLst>
-          </a:blip>
-          <a:stretch>
-            <a:fillRect/>
-          </a:stretch>
-        </p:blipFill>
-        <p:spPr>
-          <a:xfrm>
-            <a:off x="0" y="0"/>
-            <a:ext cx="12192000" cy="6858000"/>
-          </a:xfrm>
-          <a:prstGeom prst="rect">
-            <a:avLst/>
-          </a:prstGeom>
-        </p:spPr>
-      </p:pic>
-      <p:sp>
-        <p:nvSpPr>
-          <p:cNvPr id="16" name="Freeform: Shape 15">
-            <a:extLst>
-              <a:ext uri="{FF2B5EF4-FFF2-40B4-BE49-F238E27FC236}">
-                <a16:creationId xmlns:a16="http://schemas.microsoft.com/office/drawing/2014/main" id="{ADAD1991-FFD1-4E94-ABAB-7560D33008E4}"/>
-              </a:ext>
-              <a:ext uri="{C183D7F6-B498-43B3-948B-1728B52AA6E4}">
-                <adec:decorative xmlns:adec="http://schemas.microsoft.com/office/drawing/2017/decorative" val="1"/>
-              </a:ext>
-            </a:extLst>
-          </p:cNvPr>
-          <p:cNvSpPr>
-            <a:spLocks noGrp="1" noRot="1" noChangeAspect="1" noMove="1" noResize="1" noEditPoints="1" noAdjustHandles="1" noChangeArrowheads="1" noChangeShapeType="1" noTextEdit="1"/>
-          </p:cNvSpPr>
-          <p:nvPr>
-            <p:extLst>
-              <p:ext uri="{386F3935-93C4-4BCD-93E2-E3B085C9AB24}">
-                <p16:designElem xmlns:p16="http://schemas.microsoft.com/office/powerpoint/2015/main" val="1"/>
-              </p:ext>
-            </p:extLst>
-          </p:nvPr>
-        </p:nvSpPr>
-        <p:spPr>
-          <a:xfrm>
-            <a:off x="2144484" y="0"/>
-            <a:ext cx="7837716" cy="6858000"/>
-          </a:xfrm>
-          <a:custGeom>
-            <a:avLst/>
-            <a:gdLst>
-              <a:gd name="connsiteX0" fmla="*/ 2232159 w 7837716"/>
-              <a:gd name="connsiteY0" fmla="*/ 0 h 6858000"/>
-              <a:gd name="connsiteX1" fmla="*/ 5605557 w 7837716"/>
-              <a:gd name="connsiteY1" fmla="*/ 0 h 6858000"/>
-              <a:gd name="connsiteX2" fmla="*/ 5617845 w 7837716"/>
-              <a:gd name="connsiteY2" fmla="*/ 5384 h 6858000"/>
-              <a:gd name="connsiteX3" fmla="*/ 7837716 w 7837716"/>
-              <a:gd name="connsiteY3" fmla="*/ 3429000 h 6858000"/>
-              <a:gd name="connsiteX4" fmla="*/ 5617845 w 7837716"/>
-              <a:gd name="connsiteY4" fmla="*/ 6852616 h 6858000"/>
-              <a:gd name="connsiteX5" fmla="*/ 5605557 w 7837716"/>
-              <a:gd name="connsiteY5" fmla="*/ 6858000 h 6858000"/>
-              <a:gd name="connsiteX6" fmla="*/ 2232159 w 7837716"/>
-              <a:gd name="connsiteY6" fmla="*/ 6858000 h 6858000"/>
-              <a:gd name="connsiteX7" fmla="*/ 2219871 w 7837716"/>
-              <a:gd name="connsiteY7" fmla="*/ 6852616 h 6858000"/>
-              <a:gd name="connsiteX8" fmla="*/ 0 w 7837716"/>
-              <a:gd name="connsiteY8" fmla="*/ 3429000 h 6858000"/>
-              <a:gd name="connsiteX9" fmla="*/ 2219871 w 7837716"/>
-              <a:gd name="connsiteY9" fmla="*/ 5384 h 6858000"/>
-            </a:gdLst>
-            <a:ahLst/>
-            <a:cxnLst>
-              <a:cxn ang="0">
-                <a:pos x="connsiteX0" y="connsiteY0"/>
-              </a:cxn>
-              <a:cxn ang="0">
-                <a:pos x="connsiteX1" y="connsiteY1"/>
-              </a:cxn>
-              <a:cxn ang="0">
-                <a:pos x="connsiteX2" y="connsiteY2"/>
-              </a:cxn>
-              <a:cxn ang="0">
-                <a:pos x="connsiteX3" y="connsiteY3"/>
-              </a:cxn>
-              <a:cxn ang="0">
-                <a:pos x="connsiteX4" y="connsiteY4"/>
-              </a:cxn>
-              <a:cxn ang="0">
-                <a:pos x="connsiteX5" y="connsiteY5"/>
-              </a:cxn>
-              <a:cxn ang="0">
-                <a:pos x="connsiteX6" y="connsiteY6"/>
-              </a:cxn>
-              <a:cxn ang="0">
-                <a:pos x="connsiteX7" y="connsiteY7"/>
-              </a:cxn>
-              <a:cxn ang="0">
-                <a:pos x="connsiteX8" y="connsiteY8"/>
-              </a:cxn>
-              <a:cxn ang="0">
-                <a:pos x="connsiteX9" y="connsiteY9"/>
-              </a:cxn>
-            </a:cxnLst>
-            <a:rect l="l" t="t" r="r" b="b"/>
-            <a:pathLst>
-              <a:path w="7837716" h="6858000">
-                <a:moveTo>
-                  <a:pt x="2232159" y="0"/>
-                </a:moveTo>
-                <a:lnTo>
-                  <a:pt x="5605557" y="0"/>
-                </a:lnTo>
-                <a:lnTo>
-                  <a:pt x="5617845" y="5384"/>
-                </a:lnTo>
-                <a:cubicBezTo>
-                  <a:pt x="6931322" y="618789"/>
-                  <a:pt x="7837716" y="1921305"/>
-                  <a:pt x="7837716" y="3429000"/>
-                </a:cubicBezTo>
-                <a:cubicBezTo>
-                  <a:pt x="7837716" y="4936696"/>
-                  <a:pt x="6931322" y="6239212"/>
-                  <a:pt x="5617845" y="6852616"/>
-                </a:cubicBezTo>
-                <a:lnTo>
-                  <a:pt x="5605557" y="6858000"/>
-                </a:lnTo>
-                <a:lnTo>
-                  <a:pt x="2232159" y="6858000"/>
-                </a:lnTo>
-                <a:lnTo>
-                  <a:pt x="2219871" y="6852616"/>
-                </a:lnTo>
-                <a:cubicBezTo>
-                  <a:pt x="906394" y="6239212"/>
-                  <a:pt x="0" y="4936696"/>
-                  <a:pt x="0" y="3429000"/>
-                </a:cubicBezTo>
-                <a:cubicBezTo>
-                  <a:pt x="0" y="1921305"/>
-                  <a:pt x="906394" y="618789"/>
-                  <a:pt x="2219871" y="5384"/>
-                </a:cubicBezTo>
-                <a:close/>
-              </a:path>
-            </a:pathLst>
-          </a:custGeom>
-          <a:solidFill>
-            <a:schemeClr val="bg1"/>
-          </a:solidFill>
-          <a:ln>
-            <a:gradFill>
-              <a:gsLst>
-                <a:gs pos="0">
-                  <a:schemeClr val="accent1">
-                    <a:lumMod val="40000"/>
-                    <a:lumOff val="60000"/>
-                  </a:schemeClr>
-                </a:gs>
-                <a:gs pos="23000">
-                  <a:schemeClr val="accent1">
-                    <a:lumMod val="45000"/>
-                    <a:lumOff val="55000"/>
-                  </a:schemeClr>
-                </a:gs>
-                <a:gs pos="83000">
-                  <a:schemeClr val="bg2">
-                    <a:lumMod val="82000"/>
-                  </a:schemeClr>
-                </a:gs>
-                <a:gs pos="100000">
-                  <a:schemeClr val="bg2">
-                    <a:lumMod val="87000"/>
-                  </a:schemeClr>
-                </a:gs>
-              </a:gsLst>
-              <a:lin ang="5400000" scaled="1"/>
-            </a:gradFill>
-          </a:ln>
-        </p:spPr>
-        <p:style>
-          <a:lnRef idx="2">
-            <a:schemeClr val="accent1">
-              <a:shade val="50000"/>
-            </a:schemeClr>
-          </a:lnRef>
-          <a:fillRef idx="1">
-            <a:schemeClr val="accent1"/>
-          </a:fillRef>
-          <a:effectRef idx="0">
-            <a:schemeClr val="accent1"/>
-          </a:effectRef>
-          <a:fontRef idx="minor">
-            <a:schemeClr val="lt1"/>
-          </a:fontRef>
-        </p:style>
-        <p:txBody>
-          <a:bodyPr wrap="square" rtlCol="0" anchor="ctr">
-            <a:noAutofit/>
-          </a:bodyPr>
-          <a:lstStyle/>
-          <a:p>
-            <a:pPr algn="ctr"/>
-            <a:endParaRPr lang="en-US"/>
-          </a:p>
-        </p:txBody>
-      </p:sp>
-      <p:pic>
-        <p:nvPicPr>
-          <p:cNvPr id="5" name="Content Placeholder 4">
-            <a:extLst>
-              <a:ext uri="{FF2B5EF4-FFF2-40B4-BE49-F238E27FC236}">
-                <a16:creationId xmlns:a16="http://schemas.microsoft.com/office/drawing/2014/main" id="{46608679-9C80-409E-9161-F495FF9614A4}"/>
-              </a:ext>
-            </a:extLst>
-          </p:cNvPr>
-          <p:cNvPicPr>
-            <a:picLocks noGrp="1" noChangeAspect="1"/>
-          </p:cNvPicPr>
-          <p:nvPr>
-            <p:ph idx="1"/>
-          </p:nvPr>
-        </p:nvPicPr>
-        <p:blipFill>
-          <a:blip r:embed="rId3">
-            <a:extLst>
-              <a:ext uri="{28A0092B-C50C-407E-A947-70E740481C1C}">
-                <a14:useLocalDpi xmlns:a14="http://schemas.microsoft.com/office/drawing/2010/main" val="0"/>
-              </a:ext>
-            </a:extLst>
-          </a:blip>
-          <a:stretch>
-            <a:fillRect/>
-          </a:stretch>
-        </p:blipFill>
-        <p:spPr>
-          <a:xfrm>
-            <a:off x="3389702" y="850007"/>
-            <a:ext cx="5525329" cy="5166183"/>
-          </a:xfrm>
-          <a:prstGeom prst="rect">
-            <a:avLst/>
-          </a:prstGeom>
-        </p:spPr>
-      </p:pic>
-      <p:sp>
-        <p:nvSpPr>
-          <p:cNvPr id="8" name="TextBox 7">
-            <a:extLst>
-              <a:ext uri="{FF2B5EF4-FFF2-40B4-BE49-F238E27FC236}">
-                <a16:creationId xmlns:a16="http://schemas.microsoft.com/office/drawing/2014/main" id="{0E1AD40A-7B9F-48FE-8DF2-C9720D09EC34}"/>
-              </a:ext>
-            </a:extLst>
-          </p:cNvPr>
-          <p:cNvSpPr txBox="1"/>
-          <p:nvPr/>
-        </p:nvSpPr>
-        <p:spPr>
-          <a:xfrm>
-            <a:off x="4568352" y="326787"/>
-            <a:ext cx="2424190" cy="461665"/>
-          </a:xfrm>
-          <a:prstGeom prst="rect">
-            <a:avLst/>
-          </a:prstGeom>
-          <a:noFill/>
-        </p:spPr>
-        <p:txBody>
-          <a:bodyPr wrap="none" rtlCol="0">
-            <a:spAutoFit/>
-          </a:bodyPr>
-          <a:lstStyle/>
-          <a:p>
-            <a:r>
-              <a:rPr lang="en-US" sz="2400" dirty="0"/>
-              <a:t>Use Case Diagram</a:t>
-            </a:r>
-          </a:p>
-        </p:txBody>
-      </p:sp>
-    </p:spTree>
-    <p:extLst>
-      <p:ext uri="{BB962C8B-B14F-4D97-AF65-F5344CB8AC3E}">
-        <p14:creationId xmlns:p14="http://schemas.microsoft.com/office/powerpoint/2010/main" val="674919100"/>
-      </p:ext>
-    </p:extLst>
-  </p:cSld>
-  <p:clrMapOvr>
-    <a:masterClrMapping/>
-  </p:clrMapOvr>
-  <p:transition>
-    <p:push dir="u"/>
-  </p:transition>
-</p:sld>
-</file>
-
-<file path=ppt/slides/slide5.xml><?xml version="1.0" encoding="utf-8"?>
-<p:sld xmlns:a="http://schemas.openxmlformats.org/drawingml/2006/main" xmlns:r="http://schemas.openxmlformats.org/officeDocument/2006/relationships" xmlns:p="http://schemas.openxmlformats.org/presentationml/2006/main">
-  <p:cSld>
-    <p:bg>
-      <p:bgPr>
-        <a:solidFill>
-          <a:schemeClr val="bg1"/>
-        </a:solidFill>
-        <a:effectLst/>
-      </p:bgPr>
-    </p:bg>
-    <p:spTree>
-      <p:nvGrpSpPr>
-        <p:cNvPr id="1" name=""/>
-        <p:cNvGrpSpPr/>
-        <p:nvPr/>
-      </p:nvGrpSpPr>
-      <p:grpSpPr>
-        <a:xfrm>
-          <a:off x="0" y="0"/>
-          <a:ext cx="0" cy="0"/>
-          <a:chOff x="0" y="0"/>
-          <a:chExt cx="0" cy="0"/>
-        </a:xfrm>
-      </p:grpSpPr>
-      <p:sp>
-        <p:nvSpPr>
-          <p:cNvPr id="10" name="Rectangle 9">
-            <a:extLst>
-              <a:ext uri="{FF2B5EF4-FFF2-40B4-BE49-F238E27FC236}">
-                <a16:creationId xmlns:a16="http://schemas.microsoft.com/office/drawing/2014/main" id="{01D0AF59-99C3-4251-AB9A-C966C6AD4400}"/>
-              </a:ext>
-              <a:ext uri="{C183D7F6-B498-43B3-948B-1728B52AA6E4}">
-                <adec:decorative xmlns:adec="http://schemas.microsoft.com/office/drawing/2017/decorative" val="1"/>
-              </a:ext>
-            </a:extLst>
-          </p:cNvPr>
-          <p:cNvSpPr>
-            <a:spLocks noGrp="1" noRot="1" noChangeAspect="1" noMove="1" noResize="1" noEditPoints="1" noAdjustHandles="1" noChangeArrowheads="1" noChangeShapeType="1" noTextEdit="1"/>
-          </p:cNvSpPr>
-          <p:nvPr>
-            <p:extLst>
-              <p:ext uri="{386F3935-93C4-4BCD-93E2-E3B085C9AB24}">
-                <p16:designElem xmlns:p16="http://schemas.microsoft.com/office/powerpoint/2015/main" val="1"/>
-              </p:ext>
-            </p:extLst>
-          </p:nvPr>
-        </p:nvSpPr>
-        <p:spPr>
-          <a:xfrm>
-            <a:off x="0" y="0"/>
-            <a:ext cx="12192000" cy="6858000"/>
-          </a:xfrm>
-          <a:prstGeom prst="rect">
-            <a:avLst/>
-          </a:prstGeom>
-          <a:solidFill>
-            <a:schemeClr val="bg2"/>
-          </a:solidFill>
-          <a:ln>
-            <a:noFill/>
-          </a:ln>
-        </p:spPr>
-        <p:style>
-          <a:lnRef idx="2">
-            <a:schemeClr val="accent1">
-              <a:shade val="50000"/>
-            </a:schemeClr>
-          </a:lnRef>
-          <a:fillRef idx="1">
-            <a:schemeClr val="accent1"/>
-          </a:fillRef>
-          <a:effectRef idx="0">
-            <a:schemeClr val="accent1"/>
-          </a:effectRef>
-          <a:fontRef idx="minor">
-            <a:schemeClr val="lt1"/>
-          </a:fontRef>
-        </p:style>
-        <p:txBody>
-          <a:bodyPr rtlCol="0" anchor="ctr"/>
-          <a:lstStyle/>
-          <a:p>
-            <a:pPr algn="ctr"/>
-            <a:endParaRPr lang="en-US"/>
-          </a:p>
-        </p:txBody>
-      </p:sp>
-      <p:sp>
-        <p:nvSpPr>
-          <p:cNvPr id="12" name="Rectangle 11">
-            <a:extLst>
-              <a:ext uri="{FF2B5EF4-FFF2-40B4-BE49-F238E27FC236}">
-                <a16:creationId xmlns:a16="http://schemas.microsoft.com/office/drawing/2014/main" id="{1855405F-37A2-4869-9154-F8BE3BECE6C3}"/>
-              </a:ext>
-              <a:ext uri="{C183D7F6-B498-43B3-948B-1728B52AA6E4}">
-                <adec:decorative xmlns:adec="http://schemas.microsoft.com/office/drawing/2017/decorative" val="1"/>
-              </a:ext>
-            </a:extLst>
-          </p:cNvPr>
-          <p:cNvSpPr>
-            <a:spLocks noGrp="1" noRot="1" noChangeAspect="1" noMove="1" noResize="1" noEditPoints="1" noAdjustHandles="1" noChangeArrowheads="1" noChangeShapeType="1" noTextEdit="1"/>
-          </p:cNvSpPr>
-          <p:nvPr>
-            <p:extLst>
-              <p:ext uri="{386F3935-93C4-4BCD-93E2-E3B085C9AB24}">
-                <p16:designElem xmlns:p16="http://schemas.microsoft.com/office/powerpoint/2015/main" val="1"/>
-              </p:ext>
-            </p:extLst>
-          </p:nvPr>
-        </p:nvSpPr>
-        <p:spPr>
-          <a:xfrm>
-            <a:off x="477012" y="480060"/>
-            <a:ext cx="11237976" cy="5897880"/>
-          </a:xfrm>
-          <a:prstGeom prst="rect">
-            <a:avLst/>
-          </a:prstGeom>
-          <a:solidFill>
-            <a:srgbClr val="FFFFFF"/>
-          </a:solidFill>
-          <a:ln w="9525">
-            <a:noFill/>
-          </a:ln>
-          <a:effectLst>
-            <a:outerShdw blurRad="63500" dist="17780" dir="5400000" algn="t" rotWithShape="0">
-              <a:prstClr val="black">
-                <a:alpha val="43000"/>
-              </a:prstClr>
-            </a:outerShdw>
-          </a:effectLst>
-        </p:spPr>
-        <p:style>
-          <a:lnRef idx="2">
-            <a:schemeClr val="accent1">
-              <a:shade val="50000"/>
-            </a:schemeClr>
-          </a:lnRef>
-          <a:fillRef idx="1">
-            <a:schemeClr val="accent1"/>
-          </a:fillRef>
-          <a:effectRef idx="0">
-            <a:schemeClr val="accent1"/>
-          </a:effectRef>
-          <a:fontRef idx="minor">
-            <a:schemeClr val="lt1"/>
-          </a:fontRef>
-        </p:style>
-        <p:txBody>
-          <a:bodyPr rtlCol="0" anchor="ctr"/>
-          <a:lstStyle/>
-          <a:p>
-            <a:pPr algn="ctr"/>
-            <a:endParaRPr lang="en-US"/>
-          </a:p>
-        </p:txBody>
-      </p:sp>
-      <p:pic>
-        <p:nvPicPr>
-          <p:cNvPr id="5" name="Content Placeholder 4">
-            <a:extLst>
-              <a:ext uri="{FF2B5EF4-FFF2-40B4-BE49-F238E27FC236}">
-                <a16:creationId xmlns:a16="http://schemas.microsoft.com/office/drawing/2014/main" id="{C869C555-A0E6-4882-B94C-66EAF7BA6C1C}"/>
-              </a:ext>
-            </a:extLst>
-          </p:cNvPr>
-          <p:cNvPicPr>
-            <a:picLocks noGrp="1" noChangeAspect="1"/>
-          </p:cNvPicPr>
-          <p:nvPr>
-            <p:ph idx="1"/>
-          </p:nvPr>
-        </p:nvPicPr>
-        <p:blipFill>
-          <a:blip r:embed="rId2">
-            <a:extLst>
-              <a:ext uri="{28A0092B-C50C-407E-A947-70E740481C1C}">
-                <a14:useLocalDpi xmlns:a14="http://schemas.microsoft.com/office/drawing/2010/main" val="0"/>
-              </a:ext>
-            </a:extLst>
-          </a:blip>
-          <a:stretch>
-            <a:fillRect/>
-          </a:stretch>
-        </p:blipFill>
-        <p:spPr>
-          <a:xfrm>
-            <a:off x="5239408" y="738553"/>
-            <a:ext cx="4265077" cy="5380892"/>
-          </a:xfrm>
-          <a:prstGeom prst="rect">
-            <a:avLst/>
-          </a:prstGeom>
-        </p:spPr>
-      </p:pic>
-      <p:sp>
-        <p:nvSpPr>
-          <p:cNvPr id="6" name="TextBox 5">
-            <a:extLst>
-              <a:ext uri="{FF2B5EF4-FFF2-40B4-BE49-F238E27FC236}">
-                <a16:creationId xmlns:a16="http://schemas.microsoft.com/office/drawing/2014/main" id="{C2571544-1E65-4830-AD62-91704AE4A113}"/>
-              </a:ext>
-            </a:extLst>
-          </p:cNvPr>
-          <p:cNvSpPr txBox="1"/>
-          <p:nvPr/>
-        </p:nvSpPr>
-        <p:spPr>
-          <a:xfrm>
-            <a:off x="1915655" y="2828835"/>
-            <a:ext cx="2846741" cy="1200329"/>
-          </a:xfrm>
-          <a:prstGeom prst="rect">
-            <a:avLst/>
-          </a:prstGeom>
-          <a:noFill/>
-        </p:spPr>
-        <p:txBody>
-          <a:bodyPr wrap="none" rtlCol="0">
-            <a:spAutoFit/>
-          </a:bodyPr>
-          <a:lstStyle/>
-          <a:p>
-            <a:pPr algn="ctr"/>
-            <a:r>
-              <a:rPr lang="en-US" sz="2400" dirty="0"/>
-              <a:t>Architecture Diagram</a:t>
-            </a:r>
-          </a:p>
-          <a:p>
-            <a:pPr algn="ctr"/>
-            <a:r>
-              <a:rPr lang="en-US" sz="2400" dirty="0"/>
-              <a:t>+</a:t>
-            </a:r>
-          </a:p>
-          <a:p>
-            <a:pPr algn="ctr"/>
-            <a:r>
-              <a:rPr lang="en-US" sz="2400" dirty="0"/>
-              <a:t>Technology Stack</a:t>
-            </a:r>
-          </a:p>
-        </p:txBody>
-      </p:sp>
-    </p:spTree>
-    <p:extLst>
-      <p:ext uri="{BB962C8B-B14F-4D97-AF65-F5344CB8AC3E}">
-        <p14:creationId xmlns:p14="http://schemas.microsoft.com/office/powerpoint/2010/main" val="2598497886"/>
-      </p:ext>
-    </p:extLst>
-  </p:cSld>
-  <p:clrMapOvr>
-    <a:masterClrMapping/>
-  </p:clrMapOvr>
-  <p:transition>
-    <p:push dir="u"/>
-  </p:transition>
-</p:sld>
-</file>
-
-<file path=ppt/slides/slide6.xml><?xml version="1.0" encoding="utf-8"?>
-<p:sld xmlns:a="http://schemas.openxmlformats.org/drawingml/2006/main" xmlns:r="http://schemas.openxmlformats.org/officeDocument/2006/relationships" xmlns:p="http://schemas.openxmlformats.org/presentationml/2006/main">
-  <p:cSld>
-    <p:bg>
-      <p:bgPr>
-        <a:solidFill>
-          <a:schemeClr val="bg1"/>
-        </a:solidFill>
-        <a:effectLst/>
-      </p:bgPr>
-    </p:bg>
-    <p:spTree>
-      <p:nvGrpSpPr>
-        <p:cNvPr id="1" name=""/>
-        <p:cNvGrpSpPr/>
-        <p:nvPr/>
-      </p:nvGrpSpPr>
-      <p:grpSpPr>
-        <a:xfrm>
-          <a:off x="0" y="0"/>
-          <a:ext cx="0" cy="0"/>
-          <a:chOff x="0" y="0"/>
-          <a:chExt cx="0" cy="0"/>
-        </a:xfrm>
-      </p:grpSpPr>
-      <p:pic>
-        <p:nvPicPr>
-          <p:cNvPr id="5" name="Content Placeholder 4">
-            <a:extLst>
-              <a:ext uri="{FF2B5EF4-FFF2-40B4-BE49-F238E27FC236}">
-                <a16:creationId xmlns:a16="http://schemas.microsoft.com/office/drawing/2014/main" id="{68E654F1-D977-4CA9-A025-1D867297012B}"/>
-              </a:ext>
-            </a:extLst>
-          </p:cNvPr>
-          <p:cNvPicPr>
-            <a:picLocks noGrp="1" noChangeAspect="1"/>
-          </p:cNvPicPr>
-          <p:nvPr>
-            <p:ph idx="1"/>
-          </p:nvPr>
-        </p:nvPicPr>
-        <p:blipFill>
-          <a:blip r:embed="rId2">
-            <a:extLst>
-              <a:ext uri="{28A0092B-C50C-407E-A947-70E740481C1C}">
-                <a14:useLocalDpi xmlns:a14="http://schemas.microsoft.com/office/drawing/2010/main" val="0"/>
-              </a:ext>
-            </a:extLst>
-          </a:blip>
-          <a:stretch>
-            <a:fillRect/>
-          </a:stretch>
-        </p:blipFill>
-        <p:spPr>
-          <a:xfrm>
-            <a:off x="1893494" y="656233"/>
-            <a:ext cx="8405011" cy="5545534"/>
-          </a:xfrm>
-          <a:prstGeom prst="rect">
-            <a:avLst/>
-          </a:prstGeom>
-        </p:spPr>
-      </p:pic>
-    </p:spTree>
-    <p:extLst>
-      <p:ext uri="{BB962C8B-B14F-4D97-AF65-F5344CB8AC3E}">
-        <p14:creationId xmlns:p14="http://schemas.microsoft.com/office/powerpoint/2010/main" val="2113585542"/>
-      </p:ext>
-    </p:extLst>
-  </p:cSld>
-  <p:clrMapOvr>
-    <a:masterClrMapping/>
-  </p:clrMapOvr>
-  <p:transition>
-    <p:push dir="u"/>
-  </p:transition>
-</p:sld>
-</file>
-
-<file path=ppt/slides/slide7.xml><?xml version="1.0" encoding="utf-8"?>
-<p:sld xmlns:a="http://schemas.openxmlformats.org/drawingml/2006/main" xmlns:r="http://schemas.openxmlformats.org/officeDocument/2006/relationships" xmlns:p="http://schemas.openxmlformats.org/presentationml/2006/main">
-  <p:cSld>
-    <p:spTree>
-      <p:nvGrpSpPr>
-        <p:cNvPr id="1" name=""/>
-        <p:cNvGrpSpPr/>
-        <p:nvPr/>
-      </p:nvGrpSpPr>
-      <p:grpSpPr>
-        <a:xfrm>
-          <a:off x="0" y="0"/>
-          <a:ext cx="0" cy="0"/>
-          <a:chOff x="0" y="0"/>
-          <a:chExt cx="0" cy="0"/>
-        </a:xfrm>
-      </p:grpSpPr>
-      <p:pic>
-        <p:nvPicPr>
-          <p:cNvPr id="5" name="Content Placeholder 4">
-            <a:extLst>
-              <a:ext uri="{FF2B5EF4-FFF2-40B4-BE49-F238E27FC236}">
-                <a16:creationId xmlns:a16="http://schemas.microsoft.com/office/drawing/2014/main" id="{6A25C629-7DB1-4E47-83BC-73044ED85EE6}"/>
-              </a:ext>
-            </a:extLst>
-          </p:cNvPr>
-          <p:cNvPicPr>
-            <a:picLocks noGrp="1" noChangeAspect="1"/>
-          </p:cNvPicPr>
-          <p:nvPr>
-            <p:ph idx="1"/>
-          </p:nvPr>
-        </p:nvPicPr>
-        <p:blipFill>
-          <a:blip r:embed="rId2">
-            <a:extLst>
-              <a:ext uri="{28A0092B-C50C-407E-A947-70E740481C1C}">
-                <a14:useLocalDpi xmlns:a14="http://schemas.microsoft.com/office/drawing/2010/main" val="0"/>
-              </a:ext>
-            </a:extLst>
-          </a:blip>
-          <a:stretch>
-            <a:fillRect/>
-          </a:stretch>
-        </p:blipFill>
-        <p:spPr>
-          <a:xfrm>
-            <a:off x="1135539" y="2554050"/>
-            <a:ext cx="9920921" cy="1749900"/>
-          </a:xfrm>
-        </p:spPr>
-      </p:pic>
-      <p:sp>
-        <p:nvSpPr>
-          <p:cNvPr id="6" name="TextBox 5">
-            <a:extLst>
-              <a:ext uri="{FF2B5EF4-FFF2-40B4-BE49-F238E27FC236}">
-                <a16:creationId xmlns:a16="http://schemas.microsoft.com/office/drawing/2014/main" id="{79032C22-F76E-4730-AADC-F75256F3B71E}"/>
-              </a:ext>
-            </a:extLst>
-          </p:cNvPr>
-          <p:cNvSpPr txBox="1"/>
-          <p:nvPr/>
-        </p:nvSpPr>
-        <p:spPr>
-          <a:xfrm>
-            <a:off x="6208786" y="708432"/>
-            <a:ext cx="4847674" cy="707886"/>
-          </a:xfrm>
-          <a:prstGeom prst="rect">
-            <a:avLst/>
-          </a:prstGeom>
-          <a:noFill/>
-        </p:spPr>
-        <p:txBody>
-          <a:bodyPr wrap="none" rtlCol="0">
-            <a:spAutoFit/>
-          </a:bodyPr>
-          <a:lstStyle/>
-          <a:p>
-            <a:r>
-              <a:rPr lang="en-US" sz="4000" dirty="0"/>
-              <a:t>Collaboration Diagram</a:t>
-            </a:r>
-          </a:p>
-        </p:txBody>
-      </p:sp>
-    </p:spTree>
-    <p:extLst>
-      <p:ext uri="{BB962C8B-B14F-4D97-AF65-F5344CB8AC3E}">
-        <p14:creationId xmlns:p14="http://schemas.microsoft.com/office/powerpoint/2010/main" val="1039725118"/>
-      </p:ext>
-    </p:extLst>
-  </p:cSld>
-  <p:clrMapOvr>
-    <a:masterClrMapping/>
-  </p:clrMapOvr>
-  <p:transition>
-    <p:push dir="u"/>
-  </p:transition>
-</p:sld>
-</file>
-
-<file path=ppt/slides/slide8.xml><?xml version="1.0" encoding="utf-8"?>
-<p:sld xmlns:a="http://schemas.openxmlformats.org/drawingml/2006/main" xmlns:r="http://schemas.openxmlformats.org/officeDocument/2006/relationships" xmlns:p="http://schemas.openxmlformats.org/presentationml/2006/main">
-  <p:cSld>
-    <p:spTree>
-      <p:nvGrpSpPr>
-        <p:cNvPr id="1" name=""/>
-        <p:cNvGrpSpPr/>
-        <p:nvPr/>
-      </p:nvGrpSpPr>
-      <p:grpSpPr>
-        <a:xfrm>
-          <a:off x="0" y="0"/>
-          <a:ext cx="0" cy="0"/>
-          <a:chOff x="0" y="0"/>
-          <a:chExt cx="0" cy="0"/>
-        </a:xfrm>
-      </p:grpSpPr>
-      <p:pic>
-        <p:nvPicPr>
-          <p:cNvPr id="5" name="Content Placeholder 4">
-            <a:extLst>
-              <a:ext uri="{FF2B5EF4-FFF2-40B4-BE49-F238E27FC236}">
-                <a16:creationId xmlns:a16="http://schemas.microsoft.com/office/drawing/2014/main" id="{AEC13352-9598-434A-8F96-21A0FAD4CA68}"/>
-              </a:ext>
-            </a:extLst>
-          </p:cNvPr>
-          <p:cNvPicPr>
-            <a:picLocks noGrp="1" noChangeAspect="1"/>
-          </p:cNvPicPr>
-          <p:nvPr>
-            <p:ph idx="1"/>
-          </p:nvPr>
-        </p:nvPicPr>
-        <p:blipFill>
-          <a:blip r:embed="rId2">
-            <a:extLst>
-              <a:ext uri="{28A0092B-C50C-407E-A947-70E740481C1C}">
-                <a14:useLocalDpi xmlns:a14="http://schemas.microsoft.com/office/drawing/2010/main" val="0"/>
-              </a:ext>
-            </a:extLst>
-          </a:blip>
-          <a:stretch>
-            <a:fillRect/>
-          </a:stretch>
-        </p:blipFill>
-        <p:spPr>
-          <a:xfrm>
-            <a:off x="254977" y="79131"/>
-            <a:ext cx="11843238" cy="6778869"/>
-          </a:xfrm>
-        </p:spPr>
-      </p:pic>
-      <p:sp>
-        <p:nvSpPr>
-          <p:cNvPr id="6" name="TextBox 5">
-            <a:extLst>
-              <a:ext uri="{FF2B5EF4-FFF2-40B4-BE49-F238E27FC236}">
-                <a16:creationId xmlns:a16="http://schemas.microsoft.com/office/drawing/2014/main" id="{BE5DC734-9B99-49B1-BD72-C46D098BDDF9}"/>
-              </a:ext>
-            </a:extLst>
-          </p:cNvPr>
-          <p:cNvSpPr txBox="1"/>
-          <p:nvPr/>
-        </p:nvSpPr>
-        <p:spPr>
-          <a:xfrm>
-            <a:off x="7791908" y="847470"/>
-            <a:ext cx="3197414" cy="707886"/>
-          </a:xfrm>
-          <a:prstGeom prst="rect">
-            <a:avLst/>
-          </a:prstGeom>
-          <a:noFill/>
-        </p:spPr>
-        <p:txBody>
-          <a:bodyPr wrap="none" rtlCol="0">
-            <a:spAutoFit/>
-          </a:bodyPr>
-          <a:lstStyle/>
-          <a:p>
-            <a:r>
-              <a:rPr lang="en-US" sz="4000" dirty="0"/>
-              <a:t>Class Diagram</a:t>
-            </a:r>
-          </a:p>
-        </p:txBody>
-      </p:sp>
-    </p:spTree>
-    <p:extLst>
-      <p:ext uri="{BB962C8B-B14F-4D97-AF65-F5344CB8AC3E}">
-        <p14:creationId xmlns:p14="http://schemas.microsoft.com/office/powerpoint/2010/main" val="2777314522"/>
-      </p:ext>
-    </p:extLst>
-  </p:cSld>
-  <p:clrMapOvr>
-    <a:masterClrMapping/>
-  </p:clrMapOvr>
-  <p:transition>
-    <p:push dir="u"/>
-  </p:transition>
-</p:sld>
-</file>
-
-<file path=ppt/slides/slide9.xml><?xml version="1.0" encoding="utf-8"?>
-<p:sld xmlns:a="http://schemas.openxmlformats.org/drawingml/2006/main" xmlns:r="http://schemas.openxmlformats.org/officeDocument/2006/relationships" xmlns:p="http://schemas.openxmlformats.org/presentationml/2006/main">
-  <p:cSld>
-    <p:spTree>
-      <p:nvGrpSpPr>
-        <p:cNvPr id="1" name=""/>
-        <p:cNvGrpSpPr/>
-        <p:nvPr/>
-      </p:nvGrpSpPr>
-      <p:grpSpPr>
-        <a:xfrm>
-          <a:off x="0" y="0"/>
-          <a:ext cx="0" cy="0"/>
-          <a:chOff x="0" y="0"/>
-          <a:chExt cx="0" cy="0"/>
-        </a:xfrm>
-      </p:grpSpPr>
-      <p:sp>
-        <p:nvSpPr>
-          <p:cNvPr id="4" name="Title 3">
-            <a:extLst>
-              <a:ext uri="{FF2B5EF4-FFF2-40B4-BE49-F238E27FC236}">
-                <a16:creationId xmlns:a16="http://schemas.microsoft.com/office/drawing/2014/main" id="{41C16394-68E6-477A-BEF3-E9974515A288}"/>
-              </a:ext>
-            </a:extLst>
-          </p:cNvPr>
-          <p:cNvSpPr>
-            <a:spLocks noGrp="1"/>
-          </p:cNvSpPr>
-          <p:nvPr>
-            <p:ph type="title"/>
-          </p:nvPr>
-        </p:nvSpPr>
-        <p:spPr/>
-        <p:txBody>
-          <a:bodyPr/>
-          <a:lstStyle/>
-          <a:p>
-            <a:pPr algn="ctr"/>
-            <a:r>
-              <a:rPr lang="en-US" sz="11500" dirty="0"/>
-              <a:t>demo</a:t>
-            </a:r>
-            <a:endParaRPr lang="en-US" dirty="0"/>
-          </a:p>
-        </p:txBody>
-      </p:sp>
-      <p:sp>
-        <p:nvSpPr>
-          <p:cNvPr id="5" name="Text Placeholder 4">
-            <a:extLst>
-              <a:ext uri="{FF2B5EF4-FFF2-40B4-BE49-F238E27FC236}">
-                <a16:creationId xmlns:a16="http://schemas.microsoft.com/office/drawing/2014/main" id="{82DF313E-38EE-4BA7-B232-2051112D761A}"/>
-              </a:ext>
-            </a:extLst>
-          </p:cNvPr>
-          <p:cNvSpPr>
-            <a:spLocks noGrp="1"/>
-          </p:cNvSpPr>
-          <p:nvPr>
-            <p:ph type="body" idx="1"/>
-          </p:nvPr>
-        </p:nvSpPr>
-        <p:spPr/>
-        <p:txBody>
-          <a:bodyPr/>
-          <a:lstStyle/>
-          <a:p>
-            <a:pPr algn="ctr"/>
-            <a:endParaRPr lang="en-US"/>
-          </a:p>
-          <a:p>
-            <a:pPr algn="ctr"/>
-            <a:r>
-              <a:rPr lang="en-US"/>
-              <a:t>https</a:t>
-            </a:r>
-            <a:r>
-              <a:rPr lang="en-US" dirty="0"/>
-              <a:t>://mum-life.herokuapp.com</a:t>
-            </a:r>
-          </a:p>
-          <a:p>
-            <a:endParaRPr lang="en-US" dirty="0"/>
-          </a:p>
-        </p:txBody>
-      </p:sp>
-    </p:spTree>
-    <p:extLst>
-      <p:ext uri="{BB962C8B-B14F-4D97-AF65-F5344CB8AC3E}">
-        <p14:creationId xmlns:p14="http://schemas.microsoft.com/office/powerpoint/2010/main" val="1252393059"/>
       </p:ext>
     </p:extLst>
   </p:cSld>

</xml_diff>

<commit_message>
[CA-5] Updated the presentation and use case diagram.
</commit_message>
<xml_diff>
--- a/docs/Slides/Team 1 - Final Presentation - MUMLife.pptx
+++ b/docs/Slides/Team 1 - Final Presentation - MUMLife.pptx
@@ -12,9 +12,9 @@
     <p:sldId id="262" r:id="rId3"/>
     <p:sldId id="258" r:id="rId4"/>
     <p:sldId id="259" r:id="rId5"/>
-    <p:sldId id="257" r:id="rId6"/>
-    <p:sldId id="266" r:id="rId7"/>
-    <p:sldId id="261" r:id="rId8"/>
+    <p:sldId id="261" r:id="rId6"/>
+    <p:sldId id="257" r:id="rId7"/>
+    <p:sldId id="266" r:id="rId8"/>
     <p:sldId id="269" r:id="rId9"/>
     <p:sldId id="268" r:id="rId10"/>
     <p:sldId id="263" r:id="rId11"/>
@@ -5385,6 +5385,108 @@
 <file path=ppt/slides/slide5.xml><?xml version="1.0" encoding="utf-8"?>
 <p:sld xmlns:a="http://schemas.openxmlformats.org/drawingml/2006/main" xmlns:r="http://schemas.openxmlformats.org/officeDocument/2006/relationships" xmlns:p="http://schemas.openxmlformats.org/presentationml/2006/main">
   <p:cSld>
+    <p:spTree>
+      <p:nvGrpSpPr>
+        <p:cNvPr id="1" name=""/>
+        <p:cNvGrpSpPr/>
+        <p:nvPr/>
+      </p:nvGrpSpPr>
+      <p:grpSpPr>
+        <a:xfrm>
+          <a:off x="0" y="0"/>
+          <a:ext cx="0" cy="0"/>
+          <a:chOff x="0" y="0"/>
+          <a:chExt cx="0" cy="0"/>
+        </a:xfrm>
+      </p:grpSpPr>
+      <p:pic>
+        <p:nvPicPr>
+          <p:cNvPr id="5" name="Content Placeholder 4">
+            <a:extLst>
+              <a:ext uri="{FF2B5EF4-FFF2-40B4-BE49-F238E27FC236}">
+                <a16:creationId xmlns:a16="http://schemas.microsoft.com/office/drawing/2014/main" id="{AEC13352-9598-434A-8F96-21A0FAD4CA68}"/>
+              </a:ext>
+            </a:extLst>
+          </p:cNvPr>
+          <p:cNvPicPr>
+            <a:picLocks noGrp="1" noChangeAspect="1"/>
+          </p:cNvPicPr>
+          <p:nvPr>
+            <p:ph idx="1"/>
+          </p:nvPr>
+        </p:nvPicPr>
+        <p:blipFill>
+          <a:blip r:embed="rId2">
+            <a:extLst>
+              <a:ext uri="{28A0092B-C50C-407E-A947-70E740481C1C}">
+                <a14:useLocalDpi xmlns:a14="http://schemas.microsoft.com/office/drawing/2010/main" val="0"/>
+              </a:ext>
+            </a:extLst>
+          </a:blip>
+          <a:srcRect/>
+          <a:stretch/>
+        </p:blipFill>
+        <p:spPr>
+          <a:xfrm>
+            <a:off x="313892" y="235893"/>
+            <a:ext cx="11490034" cy="6424213"/>
+          </a:xfrm>
+        </p:spPr>
+      </p:pic>
+      <p:sp>
+        <p:nvSpPr>
+          <p:cNvPr id="6" name="TextBox 5">
+            <a:extLst>
+              <a:ext uri="{FF2B5EF4-FFF2-40B4-BE49-F238E27FC236}">
+                <a16:creationId xmlns:a16="http://schemas.microsoft.com/office/drawing/2014/main" id="{BE5DC734-9B99-49B1-BD72-C46D098BDDF9}"/>
+              </a:ext>
+            </a:extLst>
+          </p:cNvPr>
+          <p:cNvSpPr txBox="1"/>
+          <p:nvPr/>
+        </p:nvSpPr>
+        <p:spPr>
+          <a:xfrm>
+            <a:off x="7791908" y="847470"/>
+            <a:ext cx="3197414" cy="707886"/>
+          </a:xfrm>
+          <a:prstGeom prst="rect">
+            <a:avLst/>
+          </a:prstGeom>
+          <a:noFill/>
+        </p:spPr>
+        <p:txBody>
+          <a:bodyPr wrap="none" rtlCol="0">
+            <a:spAutoFit/>
+          </a:bodyPr>
+          <a:lstStyle/>
+          <a:p>
+            <a:r>
+              <a:rPr lang="en-US" sz="4000" dirty="0"/>
+              <a:t>Class Diagram</a:t>
+            </a:r>
+          </a:p>
+        </p:txBody>
+      </p:sp>
+    </p:spTree>
+    <p:extLst>
+      <p:ext uri="{BB962C8B-B14F-4D97-AF65-F5344CB8AC3E}">
+        <p14:creationId xmlns:p14="http://schemas.microsoft.com/office/powerpoint/2010/main" val="2777314522"/>
+      </p:ext>
+    </p:extLst>
+  </p:cSld>
+  <p:clrMapOvr>
+    <a:masterClrMapping/>
+  </p:clrMapOvr>
+  <p:transition>
+    <p:push dir="u"/>
+  </p:transition>
+</p:sld>
+</file>
+
+<file path=ppt/slides/slide6.xml><?xml version="1.0" encoding="utf-8"?>
+<p:sld xmlns:a="http://schemas.openxmlformats.org/drawingml/2006/main" xmlns:r="http://schemas.openxmlformats.org/officeDocument/2006/relationships" xmlns:p="http://schemas.openxmlformats.org/presentationml/2006/main">
+  <p:cSld>
     <p:bg>
       <p:bgPr>
         <a:solidFill>
@@ -5448,108 +5550,6 @@
     <p:extLst>
       <p:ext uri="{BB962C8B-B14F-4D97-AF65-F5344CB8AC3E}">
         <p14:creationId xmlns:p14="http://schemas.microsoft.com/office/powerpoint/2010/main" val="2113585542"/>
-      </p:ext>
-    </p:extLst>
-  </p:cSld>
-  <p:clrMapOvr>
-    <a:masterClrMapping/>
-  </p:clrMapOvr>
-  <p:transition>
-    <p:push dir="u"/>
-  </p:transition>
-</p:sld>
-</file>
-
-<file path=ppt/slides/slide6.xml><?xml version="1.0" encoding="utf-8"?>
-<p:sld xmlns:a="http://schemas.openxmlformats.org/drawingml/2006/main" xmlns:r="http://schemas.openxmlformats.org/officeDocument/2006/relationships" xmlns:p="http://schemas.openxmlformats.org/presentationml/2006/main">
-  <p:cSld>
-    <p:spTree>
-      <p:nvGrpSpPr>
-        <p:cNvPr id="1" name=""/>
-        <p:cNvGrpSpPr/>
-        <p:nvPr/>
-      </p:nvGrpSpPr>
-      <p:grpSpPr>
-        <a:xfrm>
-          <a:off x="0" y="0"/>
-          <a:ext cx="0" cy="0"/>
-          <a:chOff x="0" y="0"/>
-          <a:chExt cx="0" cy="0"/>
-        </a:xfrm>
-      </p:grpSpPr>
-      <p:pic>
-        <p:nvPicPr>
-          <p:cNvPr id="5" name="Content Placeholder 4">
-            <a:extLst>
-              <a:ext uri="{FF2B5EF4-FFF2-40B4-BE49-F238E27FC236}">
-                <a16:creationId xmlns:a16="http://schemas.microsoft.com/office/drawing/2014/main" id="{6A25C629-7DB1-4E47-83BC-73044ED85EE6}"/>
-              </a:ext>
-            </a:extLst>
-          </p:cNvPr>
-          <p:cNvPicPr>
-            <a:picLocks noGrp="1" noChangeAspect="1"/>
-          </p:cNvPicPr>
-          <p:nvPr>
-            <p:ph idx="1"/>
-          </p:nvPr>
-        </p:nvPicPr>
-        <p:blipFill>
-          <a:blip r:embed="rId2">
-            <a:extLst>
-              <a:ext uri="{28A0092B-C50C-407E-A947-70E740481C1C}">
-                <a14:useLocalDpi xmlns:a14="http://schemas.microsoft.com/office/drawing/2010/main" val="0"/>
-              </a:ext>
-            </a:extLst>
-          </a:blip>
-          <a:srcRect/>
-          <a:stretch/>
-        </p:blipFill>
-        <p:spPr>
-          <a:xfrm>
-            <a:off x="891348" y="426451"/>
-            <a:ext cx="8866802" cy="6028345"/>
-          </a:xfrm>
-        </p:spPr>
-      </p:pic>
-      <p:sp>
-        <p:nvSpPr>
-          <p:cNvPr id="6" name="TextBox 5">
-            <a:extLst>
-              <a:ext uri="{FF2B5EF4-FFF2-40B4-BE49-F238E27FC236}">
-                <a16:creationId xmlns:a16="http://schemas.microsoft.com/office/drawing/2014/main" id="{79032C22-F76E-4730-AADC-F75256F3B71E}"/>
-              </a:ext>
-            </a:extLst>
-          </p:cNvPr>
-          <p:cNvSpPr txBox="1"/>
-          <p:nvPr/>
-        </p:nvSpPr>
-        <p:spPr>
-          <a:xfrm>
-            <a:off x="6208786" y="708432"/>
-            <a:ext cx="4847674" cy="707886"/>
-          </a:xfrm>
-          <a:prstGeom prst="rect">
-            <a:avLst/>
-          </a:prstGeom>
-          <a:noFill/>
-        </p:spPr>
-        <p:txBody>
-          <a:bodyPr wrap="none" rtlCol="0">
-            <a:spAutoFit/>
-          </a:bodyPr>
-          <a:lstStyle/>
-          <a:p>
-            <a:r>
-              <a:rPr lang="en-US" sz="4000" dirty="0"/>
-              <a:t>Collaboration Diagram</a:t>
-            </a:r>
-          </a:p>
-        </p:txBody>
-      </p:sp>
-    </p:spTree>
-    <p:extLst>
-      <p:ext uri="{BB962C8B-B14F-4D97-AF65-F5344CB8AC3E}">
-        <p14:creationId xmlns:p14="http://schemas.microsoft.com/office/powerpoint/2010/main" val="1039725118"/>
       </p:ext>
     </p:extLst>
   </p:cSld>
@@ -5584,7 +5584,7 @@
           <p:cNvPr id="5" name="Content Placeholder 4">
             <a:extLst>
               <a:ext uri="{FF2B5EF4-FFF2-40B4-BE49-F238E27FC236}">
-                <a16:creationId xmlns:a16="http://schemas.microsoft.com/office/drawing/2014/main" id="{AEC13352-9598-434A-8F96-21A0FAD4CA68}"/>
+                <a16:creationId xmlns:a16="http://schemas.microsoft.com/office/drawing/2014/main" id="{6A25C629-7DB1-4E47-83BC-73044ED85EE6}"/>
               </a:ext>
             </a:extLst>
           </p:cNvPr>
@@ -5608,8 +5608,8 @@
         </p:blipFill>
         <p:spPr>
           <a:xfrm>
-            <a:off x="174381" y="850882"/>
-            <a:ext cx="11843238" cy="4866210"/>
+            <a:off x="891348" y="426451"/>
+            <a:ext cx="8866802" cy="6028345"/>
           </a:xfrm>
         </p:spPr>
       </p:pic>
@@ -5618,7 +5618,7 @@
           <p:cNvPr id="6" name="TextBox 5">
             <a:extLst>
               <a:ext uri="{FF2B5EF4-FFF2-40B4-BE49-F238E27FC236}">
-                <a16:creationId xmlns:a16="http://schemas.microsoft.com/office/drawing/2014/main" id="{BE5DC734-9B99-49B1-BD72-C46D098BDDF9}"/>
+                <a16:creationId xmlns:a16="http://schemas.microsoft.com/office/drawing/2014/main" id="{79032C22-F76E-4730-AADC-F75256F3B71E}"/>
               </a:ext>
             </a:extLst>
           </p:cNvPr>
@@ -5627,8 +5627,8 @@
         </p:nvSpPr>
         <p:spPr>
           <a:xfrm>
-            <a:off x="7791908" y="847470"/>
-            <a:ext cx="3197414" cy="707886"/>
+            <a:off x="6208786" y="708432"/>
+            <a:ext cx="4847674" cy="707886"/>
           </a:xfrm>
           <a:prstGeom prst="rect">
             <a:avLst/>
@@ -5643,7 +5643,7 @@
           <a:p>
             <a:r>
               <a:rPr lang="en-US" sz="4000" dirty="0"/>
-              <a:t>Class Diagram</a:t>
+              <a:t>Collaboration Diagram</a:t>
             </a:r>
           </a:p>
         </p:txBody>
@@ -5651,7 +5651,7 @@
     </p:spTree>
     <p:extLst>
       <p:ext uri="{BB962C8B-B14F-4D97-AF65-F5344CB8AC3E}">
-        <p14:creationId xmlns:p14="http://schemas.microsoft.com/office/powerpoint/2010/main" val="2777314522"/>
+        <p14:creationId xmlns:p14="http://schemas.microsoft.com/office/powerpoint/2010/main" val="1039725118"/>
       </p:ext>
     </p:extLst>
   </p:cSld>

</xml_diff>